<commit_message>
Update slides for Termin_1.
</commit_message>
<xml_diff>
--- a/Termin_1/folien/UebungModellierung#1.pptx
+++ b/Termin_1/folien/UebungModellierung#1.pptx
@@ -5,10 +5,10 @@
     <p:sldMasterId id="2147483648" r:id="rId1"/>
   </p:sldMasterIdLst>
   <p:notesMasterIdLst>
-    <p:notesMasterId r:id="rId16"/>
+    <p:notesMasterId r:id="rId17"/>
   </p:notesMasterIdLst>
   <p:handoutMasterIdLst>
-    <p:handoutMasterId r:id="rId17"/>
+    <p:handoutMasterId r:id="rId18"/>
   </p:handoutMasterIdLst>
   <p:sldIdLst>
     <p:sldId id="892" r:id="rId2"/>
@@ -24,21 +24,22 @@
     <p:sldId id="989" r:id="rId12"/>
     <p:sldId id="983" r:id="rId13"/>
     <p:sldId id="984" r:id="rId14"/>
-    <p:sldId id="988" r:id="rId15"/>
+    <p:sldId id="990" r:id="rId15"/>
+    <p:sldId id="988" r:id="rId16"/>
   </p:sldIdLst>
   <p:sldSz cx="9144000" cy="6858000" type="screen4x3"/>
   <p:notesSz cx="7099300" cy="9601200"/>
   <p:embeddedFontLst>
     <p:embeddedFont>
       <p:font typeface="Calibri" pitchFamily="34" charset="0"/>
-      <p:regular r:id="rId18"/>
-      <p:bold r:id="rId19"/>
-      <p:italic r:id="rId20"/>
-      <p:boldItalic r:id="rId21"/>
+      <p:regular r:id="rId19"/>
+      <p:bold r:id="rId20"/>
+      <p:italic r:id="rId21"/>
+      <p:boldItalic r:id="rId22"/>
     </p:embeddedFont>
     <p:embeddedFont>
       <p:font typeface="MV Boli" pitchFamily="2" charset="0"/>
-      <p:regular r:id="rId22"/>
+      <p:regular r:id="rId23"/>
     </p:embeddedFont>
   </p:embeddedFontLst>
   <p:defaultTextStyle>
@@ -400,7 +401,7 @@
     </p:spTree>
     <p:extLst>
       <p:ext uri="{BB962C8B-B14F-4D97-AF65-F5344CB8AC3E}">
-        <p14:creationId xmlns:p14="http://schemas.microsoft.com/office/powerpoint/2010/main" xmlns="" val="1882660213"/>
+        <p14:creationId xmlns="" xmlns:p14="http://schemas.microsoft.com/office/powerpoint/2010/main" val="1882660213"/>
       </p:ext>
     </p:extLst>
   </p:cSld>
@@ -739,7 +740,7 @@
     </p:spTree>
     <p:extLst>
       <p:ext uri="{BB962C8B-B14F-4D97-AF65-F5344CB8AC3E}">
-        <p14:creationId xmlns:p14="http://schemas.microsoft.com/office/powerpoint/2010/main" xmlns="" val="2781074432"/>
+        <p14:creationId xmlns="" xmlns:p14="http://schemas.microsoft.com/office/powerpoint/2010/main" val="2781074432"/>
       </p:ext>
     </p:extLst>
   </p:cSld>
@@ -1494,6 +1495,108 @@
 </p:notes>
 </file>
 
+<file path=ppt/notesSlides/notesSlide15.xml><?xml version="1.0" encoding="utf-8"?>
+<p:notes xmlns:a="http://schemas.openxmlformats.org/drawingml/2006/main" xmlns:r="http://schemas.openxmlformats.org/officeDocument/2006/relationships" xmlns:p="http://schemas.openxmlformats.org/presentationml/2006/main">
+  <p:cSld>
+    <p:spTree>
+      <p:nvGrpSpPr>
+        <p:cNvPr id="1" name=""/>
+        <p:cNvGrpSpPr/>
+        <p:nvPr/>
+      </p:nvGrpSpPr>
+      <p:grpSpPr>
+        <a:xfrm>
+          <a:off x="0" y="0"/>
+          <a:ext cx="0" cy="0"/>
+          <a:chOff x="0" y="0"/>
+          <a:chExt cx="0" cy="0"/>
+        </a:xfrm>
+      </p:grpSpPr>
+      <p:sp>
+        <p:nvSpPr>
+          <p:cNvPr id="54274" name="Rectangle 7"/>
+          <p:cNvSpPr>
+            <a:spLocks noGrp="1" noChangeArrowheads="1"/>
+          </p:cNvSpPr>
+          <p:nvPr>
+            <p:ph type="sldNum" sz="quarter" idx="5"/>
+          </p:nvPr>
+        </p:nvSpPr>
+        <p:spPr/>
+        <p:txBody>
+          <a:bodyPr/>
+          <a:lstStyle/>
+          <a:p>
+            <a:pPr>
+              <a:defRPr/>
+            </a:pPr>
+            <a:fld id="{10FECC1A-FDCF-43AB-8611-DC3836B8FF46}" type="slidenum">
+              <a:rPr lang="de-DE" smtClean="0"/>
+              <a:pPr>
+                <a:defRPr/>
+              </a:pPr>
+              <a:t>15</a:t>
+            </a:fld>
+            <a:endParaRPr lang="de-DE" smtClean="0"/>
+          </a:p>
+        </p:txBody>
+      </p:sp>
+      <p:sp>
+        <p:nvSpPr>
+          <p:cNvPr id="28675" name="Rectangle 2"/>
+          <p:cNvSpPr>
+            <a:spLocks noGrp="1" noRot="1" noChangeAspect="1" noChangeArrowheads="1" noTextEdit="1"/>
+          </p:cNvSpPr>
+          <p:nvPr>
+            <p:ph type="sldImg"/>
+          </p:nvPr>
+        </p:nvSpPr>
+        <p:spPr>
+          <a:xfrm>
+            <a:off x="1152525" y="720725"/>
+            <a:ext cx="4799013" cy="3598863"/>
+          </a:xfrm>
+          <a:ln/>
+        </p:spPr>
+      </p:sp>
+      <p:sp>
+        <p:nvSpPr>
+          <p:cNvPr id="28676" name="Rectangle 3"/>
+          <p:cNvSpPr>
+            <a:spLocks noGrp="1" noChangeArrowheads="1"/>
+          </p:cNvSpPr>
+          <p:nvPr>
+            <p:ph type="body" idx="1"/>
+          </p:nvPr>
+        </p:nvSpPr>
+        <p:spPr>
+          <a:xfrm>
+            <a:off x="946150" y="4559300"/>
+            <a:ext cx="5207000" cy="4321175"/>
+          </a:xfrm>
+          <a:noFill/>
+          <a:ln/>
+        </p:spPr>
+        <p:txBody>
+          <a:bodyPr/>
+          <a:lstStyle/>
+          <a:p>
+            <a:pPr eaLnBrk="1" hangingPunct="1"/>
+            <a:r>
+              <a:rPr lang="en-US" dirty="0" smtClean="0"/>
+              <a:t>This is the main motivation…</a:t>
+            </a:r>
+          </a:p>
+        </p:txBody>
+      </p:sp>
+    </p:spTree>
+  </p:cSld>
+  <p:clrMapOvr>
+    <a:masterClrMapping/>
+  </p:clrMapOvr>
+</p:notes>
+</file>
+
 <file path=ppt/notesSlides/notesSlide2.xml><?xml version="1.0" encoding="utf-8"?>
 <p:notes xmlns:a="http://schemas.openxmlformats.org/drawingml/2006/main" xmlns:r="http://schemas.openxmlformats.org/officeDocument/2006/relationships" xmlns:p="http://schemas.openxmlformats.org/presentationml/2006/main">
   <p:cSld>
@@ -4224,7 +4327,37 @@
                 <a:latin typeface="Calibri" pitchFamily="34" charset="0"/>
                 <a:cs typeface="+mn-cs"/>
               </a:rPr>
-              <a:t>Übung zur Einführung in die Modellierung, Wintersemester 2016/17                 #</a:t>
+              <a:t>Seminar „Einführung </a:t>
+            </a:r>
+            <a:r>
+              <a:rPr lang="de-DE" noProof="0" dirty="0" smtClean="0">
+                <a:solidFill>
+                  <a:schemeClr val="bg1"/>
+                </a:solidFill>
+                <a:latin typeface="Calibri" pitchFamily="34" charset="0"/>
+                <a:cs typeface="+mn-cs"/>
+              </a:rPr>
+              <a:t>in die </a:t>
+            </a:r>
+            <a:r>
+              <a:rPr lang="de-DE" noProof="0" dirty="0" smtClean="0">
+                <a:solidFill>
+                  <a:schemeClr val="bg1"/>
+                </a:solidFill>
+                <a:latin typeface="Calibri" pitchFamily="34" charset="0"/>
+                <a:cs typeface="+mn-cs"/>
+              </a:rPr>
+              <a:t>Modellierung“, </a:t>
+            </a:r>
+            <a:r>
+              <a:rPr lang="de-DE" noProof="0" dirty="0" smtClean="0">
+                <a:solidFill>
+                  <a:schemeClr val="bg1"/>
+                </a:solidFill>
+                <a:latin typeface="Calibri" pitchFamily="34" charset="0"/>
+                <a:cs typeface="+mn-cs"/>
+              </a:rPr>
+              <a:t>Wintersemester 2016/17                 #</a:t>
             </a:r>
             <a:fld id="{19621714-58BB-457A-826B-841F6E217726}" type="slidenum">
               <a:rPr lang="de-DE" noProof="0" smtClean="0">
@@ -4995,38 +5128,50 @@
                 <a:rPr lang="de-DE" sz="2000" dirty="0" smtClean="0">
                   <a:latin typeface="Calibri" pitchFamily="34" charset="0"/>
                 </a:rPr>
-                <a:t>Übung im </a:t>
+                <a:t>Seminar </a:t>
               </a:r>
               <a:r>
-                <a:rPr lang="de-DE" sz="2000" smtClean="0">
+                <a:rPr lang="de-DE" sz="2000" i="1" dirty="0" smtClean="0">
                   <a:latin typeface="Calibri" pitchFamily="34" charset="0"/>
                 </a:rPr>
-                <a:t>Modul </a:t>
+                <a:t>Einführung in die Modellierung</a:t>
+              </a:r>
+              <a:r>
+                <a:rPr lang="de-DE" sz="2000" dirty="0" smtClean="0">
+                  <a:latin typeface="Calibri" pitchFamily="34" charset="0"/>
+                </a:rPr>
+                <a:t/>
               </a:r>
               <a:br>
-                <a:rPr lang="de-DE" sz="2000" smtClean="0">
+                <a:rPr lang="de-DE" sz="2000" dirty="0" smtClean="0">
                   <a:latin typeface="Calibri" pitchFamily="34" charset="0"/>
                 </a:rPr>
               </a:br>
               <a:r>
-                <a:rPr lang="de-DE" sz="2000" smtClean="0">
+                <a:rPr lang="de-DE" sz="2000" dirty="0" smtClean="0">
+                  <a:latin typeface="Calibri" pitchFamily="34" charset="0"/>
+                </a:rPr>
+                <a:t>im Modul </a:t>
+              </a:r>
+              <a:r>
+                <a:rPr lang="de-DE" sz="2000" i="1" dirty="0" smtClean="0">
                   <a:latin typeface="Calibri" pitchFamily="34" charset="0"/>
                 </a:rPr>
                 <a:t>Versuchsplanung </a:t>
               </a:r>
               <a:r>
-                <a:rPr lang="de-DE" sz="2000" dirty="0" smtClean="0">
+                <a:rPr lang="de-DE" sz="2000" i="1" dirty="0" smtClean="0">
                   <a:latin typeface="Calibri" pitchFamily="34" charset="0"/>
                 </a:rPr>
-                <a:t>und </a:t>
+                <a:t>und Geoökologische </a:t>
               </a:r>
               <a:r>
-                <a:rPr lang="de-DE" sz="2000" smtClean="0">
+                <a:rPr lang="de-DE" sz="2000" i="1" dirty="0" smtClean="0">
                   <a:latin typeface="Calibri" pitchFamily="34" charset="0"/>
                 </a:rPr>
-                <a:t>Geoökologische Modellierung</a:t>
+                <a:t>Modellierung</a:t>
               </a:r>
-              <a:endParaRPr lang="de-DE" sz="2000" dirty="0" smtClean="0">
+              <a:endParaRPr lang="de-DE" sz="2000" i="1" dirty="0" smtClean="0">
                 <a:latin typeface="Calibri" pitchFamily="34" charset="0"/>
               </a:endParaRPr>
             </a:p>
@@ -6004,6 +6149,142 @@
           <a:chExt cx="0" cy="0"/>
         </a:xfrm>
       </p:grpSpPr>
+      <p:pic>
+        <p:nvPicPr>
+          <p:cNvPr id="6146" name="Picture 2" descr="http://www.kino.de/wp-content/gallery/fight-club-1999/fight-club-edward-norton-11-rcm0x1920u.jpg"/>
+          <p:cNvPicPr>
+            <a:picLocks noChangeAspect="1" noChangeArrowheads="1"/>
+          </p:cNvPicPr>
+          <p:nvPr/>
+        </p:nvPicPr>
+        <p:blipFill>
+          <a:blip r:embed="rId3" cstate="print">
+            <a:grayscl/>
+          </a:blip>
+          <a:srcRect r="4478"/>
+          <a:stretch>
+            <a:fillRect/>
+          </a:stretch>
+        </p:blipFill>
+        <p:spPr bwMode="auto">
+          <a:xfrm>
+            <a:off x="-1" y="476250"/>
+            <a:ext cx="9144001" cy="6381750"/>
+          </a:xfrm>
+          <a:prstGeom prst="rect">
+            <a:avLst/>
+          </a:prstGeom>
+          <a:noFill/>
+        </p:spPr>
+      </p:pic>
+      <p:sp>
+        <p:nvSpPr>
+          <p:cNvPr id="13" name="Textfeld 12"/>
+          <p:cNvSpPr txBox="1"/>
+          <p:nvPr/>
+        </p:nvSpPr>
+        <p:spPr>
+          <a:xfrm>
+            <a:off x="1" y="-21515"/>
+            <a:ext cx="9108504" cy="476250"/>
+          </a:xfrm>
+          <a:prstGeom prst="rect">
+            <a:avLst/>
+          </a:prstGeom>
+          <a:noFill/>
+          <a:effectLst/>
+        </p:spPr>
+        <p:txBody>
+          <a:bodyPr wrap="square" lIns="0" rIns="0" rtlCol="0">
+            <a:noAutofit/>
+          </a:bodyPr>
+          <a:lstStyle/>
+          <a:p>
+            <a:pPr algn="ctr">
+              <a:spcAft>
+                <a:spcPts val="0"/>
+              </a:spcAft>
+              <a:defRPr/>
+            </a:pPr>
+            <a:r>
+              <a:rPr lang="en-US" sz="2800" dirty="0" smtClean="0">
+                <a:solidFill>
+                  <a:schemeClr val="bg1">
+                    <a:lumMod val="85000"/>
+                  </a:schemeClr>
+                </a:solidFill>
+                <a:latin typeface="Calibri" pitchFamily="34" charset="0"/>
+              </a:rPr>
+              <a:t>You  </a:t>
+            </a:r>
+            <a:r>
+              <a:rPr lang="en-US" sz="2800" dirty="0" err="1" smtClean="0">
+                <a:solidFill>
+                  <a:schemeClr val="bg1">
+                    <a:lumMod val="85000"/>
+                  </a:schemeClr>
+                </a:solidFill>
+                <a:latin typeface="Calibri" pitchFamily="34" charset="0"/>
+              </a:rPr>
+              <a:t>Gotta</a:t>
+            </a:r>
+            <a:r>
+              <a:rPr lang="en-US" sz="2800" dirty="0" smtClean="0">
+                <a:solidFill>
+                  <a:schemeClr val="bg1">
+                    <a:lumMod val="85000"/>
+                  </a:schemeClr>
+                </a:solidFill>
+                <a:latin typeface="Calibri" pitchFamily="34" charset="0"/>
+              </a:rPr>
+              <a:t> Fight </a:t>
+            </a:r>
+            <a:endParaRPr lang="en-US" sz="2800" dirty="0" smtClean="0">
+              <a:solidFill>
+                <a:schemeClr val="bg1">
+                  <a:lumMod val="85000"/>
+                </a:schemeClr>
+              </a:solidFill>
+              <a:latin typeface="Calibri" pitchFamily="34" charset="0"/>
+            </a:endParaRPr>
+          </a:p>
+        </p:txBody>
+      </p:sp>
+    </p:spTree>
+  </p:cSld>
+  <p:clrMapOvr>
+    <a:masterClrMapping/>
+  </p:clrMapOvr>
+  <p:transition>
+    <p:zoom/>
+  </p:transition>
+  <p:timing>
+    <p:tnLst>
+      <p:par>
+        <p:cTn id="1" dur="indefinite" restart="never" nodeType="tmRoot"/>
+      </p:par>
+    </p:tnLst>
+  </p:timing>
+</p:sld>
+</file>
+
+<file path=ppt/slides/slide14.xml><?xml version="1.0" encoding="utf-8"?>
+<p:sld xmlns:a="http://schemas.openxmlformats.org/drawingml/2006/main" xmlns:r="http://schemas.openxmlformats.org/officeDocument/2006/relationships" xmlns:p="http://schemas.openxmlformats.org/presentationml/2006/main">
+  <p:cSld>
+    <p:spTree>
+      <p:nvGrpSpPr>
+        <p:cNvPr id="1" name=""/>
+        <p:cNvGrpSpPr/>
+        <p:nvPr/>
+      </p:nvGrpSpPr>
+      <p:grpSpPr>
+        <a:xfrm>
+          <a:off x="0" y="0"/>
+          <a:ext cx="0" cy="0"/>
+          <a:chOff x="0" y="0"/>
+          <a:chExt cx="0" cy="0"/>
+        </a:xfrm>
+      </p:grpSpPr>
       <p:sp>
         <p:nvSpPr>
           <p:cNvPr id="13" name="Textfeld 12"/>
@@ -6378,7 +6659,7 @@
 </p:sld>
 </file>
 
-<file path=ppt/slides/slide14.xml><?xml version="1.0" encoding="utf-8"?>
+<file path=ppt/slides/slide15.xml><?xml version="1.0" encoding="utf-8"?>
 <p:sld xmlns:a="http://schemas.openxmlformats.org/drawingml/2006/main" xmlns:r="http://schemas.openxmlformats.org/officeDocument/2006/relationships" xmlns:p="http://schemas.openxmlformats.org/presentationml/2006/main" showMasterSp="0">
   <p:cSld>
     <p:spTree>

</xml_diff>

<commit_message>
modified tasks not to contain tests with NULL - these seem to be incorrectly treated in CF (bug reported)
</commit_message>
<xml_diff>
--- a/Termin_1/folien/UebungModellierung#1.pptx
+++ b/Termin_1/folien/UebungModellierung#1.pptx
@@ -16,16 +16,16 @@
     <p:sldId id="980" r:id="rId4"/>
     <p:sldId id="994" r:id="rId5"/>
     <p:sldId id="979" r:id="rId6"/>
-    <p:sldId id="825" r:id="rId7"/>
-    <p:sldId id="985" r:id="rId8"/>
-    <p:sldId id="981" r:id="rId9"/>
-    <p:sldId id="986" r:id="rId10"/>
-    <p:sldId id="987" r:id="rId11"/>
-    <p:sldId id="982" r:id="rId12"/>
-    <p:sldId id="989" r:id="rId13"/>
-    <p:sldId id="983" r:id="rId14"/>
-    <p:sldId id="984" r:id="rId15"/>
-    <p:sldId id="993" r:id="rId16"/>
+    <p:sldId id="993" r:id="rId7"/>
+    <p:sldId id="825" r:id="rId8"/>
+    <p:sldId id="985" r:id="rId9"/>
+    <p:sldId id="981" r:id="rId10"/>
+    <p:sldId id="986" r:id="rId11"/>
+    <p:sldId id="987" r:id="rId12"/>
+    <p:sldId id="982" r:id="rId13"/>
+    <p:sldId id="989" r:id="rId14"/>
+    <p:sldId id="983" r:id="rId15"/>
+    <p:sldId id="984" r:id="rId16"/>
     <p:sldId id="988" r:id="rId17"/>
   </p:sldIdLst>
   <p:sldSz cx="9144000" cy="6858000" type="screen4x3"/>
@@ -5414,6 +5414,545 @@
       </p:sp>
       <p:pic>
         <p:nvPicPr>
+          <p:cNvPr id="8194" name="Picture 2" descr="http://developer.r-project.org/Logo/Rlogo-1.png"/>
+          <p:cNvPicPr>
+            <a:picLocks noChangeAspect="1" noChangeArrowheads="1"/>
+          </p:cNvPicPr>
+          <p:nvPr/>
+        </p:nvPicPr>
+        <p:blipFill>
+          <a:blip r:embed="rId3" cstate="print"/>
+          <a:srcRect/>
+          <a:stretch>
+            <a:fillRect/>
+          </a:stretch>
+        </p:blipFill>
+        <p:spPr bwMode="auto">
+          <a:xfrm>
+            <a:off x="1115616" y="954013"/>
+            <a:ext cx="6336630" cy="4807099"/>
+          </a:xfrm>
+          <a:prstGeom prst="rect">
+            <a:avLst/>
+          </a:prstGeom>
+          <a:noFill/>
+        </p:spPr>
+      </p:pic>
+      <p:sp>
+        <p:nvSpPr>
+          <p:cNvPr id="4" name="Rechteck 3"/>
+          <p:cNvSpPr/>
+          <p:nvPr/>
+        </p:nvSpPr>
+        <p:spPr bwMode="auto">
+          <a:xfrm>
+            <a:off x="0" y="476250"/>
+            <a:ext cx="9144000" cy="5761062"/>
+          </a:xfrm>
+          <a:prstGeom prst="rect">
+            <a:avLst/>
+          </a:prstGeom>
+          <a:solidFill>
+            <a:srgbClr val="FFFFFF">
+              <a:alpha val="60000"/>
+            </a:srgbClr>
+          </a:solidFill>
+          <a:ln w="19050" cap="flat" cmpd="sng" algn="ctr">
+            <a:noFill/>
+            <a:prstDash val="solid"/>
+            <a:round/>
+            <a:headEnd type="none" w="med" len="med"/>
+            <a:tailEnd type="none" w="med" len="med"/>
+          </a:ln>
+          <a:effectLst/>
+        </p:spPr>
+        <p:txBody>
+          <a:bodyPr vert="horz" wrap="square" lIns="91440" tIns="45720" rIns="91440" bIns="45720" numCol="1" rtlCol="0" anchor="t" anchorCtr="0" compatLnSpc="1">
+            <a:prstTxWarp prst="textNoShape">
+              <a:avLst/>
+            </a:prstTxWarp>
+          </a:bodyPr>
+          <a:lstStyle/>
+          <a:p>
+            <a:pPr marL="0" marR="0" indent="0" algn="l" defTabSz="914400" rtl="0" eaLnBrk="1" fontAlgn="base" latinLnBrk="0" hangingPunct="1">
+              <a:lnSpc>
+                <a:spcPct val="100000"/>
+              </a:lnSpc>
+              <a:spcBef>
+                <a:spcPct val="0"/>
+              </a:spcBef>
+              <a:spcAft>
+                <a:spcPct val="0"/>
+              </a:spcAft>
+              <a:buClrTx/>
+              <a:buSzTx/>
+              <a:buFontTx/>
+              <a:buNone/>
+              <a:tabLst/>
+            </a:pPr>
+            <a:endParaRPr kumimoji="0" lang="de-DE" sz="1600" b="0" i="0" u="none" strike="noStrike" cap="none" normalizeH="0" baseline="0" smtClean="0">
+              <a:ln>
+                <a:noFill/>
+              </a:ln>
+              <a:solidFill>
+                <a:schemeClr val="tx1"/>
+              </a:solidFill>
+              <a:effectLst/>
+              <a:latin typeface="Arial" charset="0"/>
+            </a:endParaRPr>
+          </a:p>
+        </p:txBody>
+      </p:sp>
+      <p:sp>
+        <p:nvSpPr>
+          <p:cNvPr id="5" name="Textfeld 4"/>
+          <p:cNvSpPr txBox="1"/>
+          <p:nvPr/>
+        </p:nvSpPr>
+        <p:spPr>
+          <a:xfrm>
+            <a:off x="755575" y="908720"/>
+            <a:ext cx="8209037" cy="3647152"/>
+          </a:xfrm>
+          <a:prstGeom prst="rect">
+            <a:avLst/>
+          </a:prstGeom>
+          <a:noFill/>
+        </p:spPr>
+        <p:txBody>
+          <a:bodyPr wrap="square" rtlCol="0">
+            <a:spAutoFit/>
+          </a:bodyPr>
+          <a:lstStyle/>
+          <a:p>
+            <a:pPr>
+              <a:spcAft>
+                <a:spcPts val="600"/>
+              </a:spcAft>
+            </a:pPr>
+            <a:r>
+              <a:rPr lang="de-DE" sz="2800" dirty="0" smtClean="0">
+                <a:latin typeface="Calibri" pitchFamily="34" charset="0"/>
+              </a:rPr>
+              <a:t>Programmieren in R </a:t>
+            </a:r>
+          </a:p>
+          <a:p>
+            <a:pPr marL="174625" indent="-174625">
+              <a:spcAft>
+                <a:spcPts val="600"/>
+              </a:spcAft>
+              <a:buFont typeface="Wingdings" pitchFamily="2" charset="2"/>
+              <a:buChar char="§"/>
+            </a:pPr>
+            <a:r>
+              <a:rPr lang="de-DE" sz="2400" dirty="0" smtClean="0">
+                <a:latin typeface="Calibri" pitchFamily="34" charset="0"/>
+              </a:rPr>
+              <a:t>frei verfügbar (und quelloffen)</a:t>
+            </a:r>
+          </a:p>
+          <a:p>
+            <a:pPr marL="174625" indent="-174625">
+              <a:spcAft>
+                <a:spcPts val="600"/>
+              </a:spcAft>
+              <a:buFont typeface="Wingdings" pitchFamily="2" charset="2"/>
+              <a:buChar char="§"/>
+            </a:pPr>
+            <a:r>
+              <a:rPr lang="de-DE" sz="2400" dirty="0" smtClean="0">
+                <a:latin typeface="Calibri" pitchFamily="34" charset="0"/>
+              </a:rPr>
+              <a:t>Linux/Mac/Windows</a:t>
+            </a:r>
+          </a:p>
+          <a:p>
+            <a:pPr marL="174625" indent="-174625">
+              <a:spcAft>
+                <a:spcPts val="600"/>
+              </a:spcAft>
+              <a:buFont typeface="Wingdings" pitchFamily="2" charset="2"/>
+              <a:buChar char="§"/>
+            </a:pPr>
+            <a:r>
+              <a:rPr lang="de-DE" sz="2400" dirty="0" smtClean="0">
+                <a:latin typeface="Calibri" pitchFamily="34" charset="0"/>
+              </a:rPr>
+              <a:t>leicht erlernbar und gut lesbar</a:t>
+            </a:r>
+          </a:p>
+          <a:p>
+            <a:pPr marL="174625" indent="-174625">
+              <a:spcAft>
+                <a:spcPts val="600"/>
+              </a:spcAft>
+              <a:buFont typeface="Wingdings" pitchFamily="2" charset="2"/>
+              <a:buChar char="§"/>
+            </a:pPr>
+            <a:r>
+              <a:rPr lang="de-DE" sz="2400" dirty="0" smtClean="0">
+                <a:latin typeface="Calibri" pitchFamily="34" charset="0"/>
+              </a:rPr>
+              <a:t>interaktiv</a:t>
+            </a:r>
+          </a:p>
+          <a:p>
+            <a:pPr marL="174625" indent="-174625">
+              <a:spcAft>
+                <a:spcPts val="600"/>
+              </a:spcAft>
+              <a:buFont typeface="Wingdings" pitchFamily="2" charset="2"/>
+              <a:buChar char="§"/>
+            </a:pPr>
+            <a:r>
+              <a:rPr lang="de-DE" sz="2400" dirty="0" smtClean="0">
+                <a:latin typeface="Calibri" pitchFamily="34" charset="0"/>
+              </a:rPr>
+              <a:t>Tausende Erweiterungspakete für unterschiedlichste Aufgaben</a:t>
+            </a:r>
+          </a:p>
+          <a:p>
+            <a:pPr marL="174625" indent="-174625">
+              <a:spcAft>
+                <a:spcPts val="600"/>
+              </a:spcAft>
+              <a:buFont typeface="Wingdings" pitchFamily="2" charset="2"/>
+              <a:buChar char="§"/>
+            </a:pPr>
+            <a:r>
+              <a:rPr lang="de-DE" sz="2400" dirty="0" smtClean="0">
+                <a:latin typeface="Calibri" pitchFamily="34" charset="0"/>
+              </a:rPr>
+              <a:t>aktive Nutzer- und Entwicklercommunity</a:t>
+            </a:r>
+          </a:p>
+          <a:p>
+            <a:pPr marL="174625" indent="-174625">
+              <a:spcAft>
+                <a:spcPts val="600"/>
+              </a:spcAft>
+              <a:buFont typeface="Wingdings" pitchFamily="2" charset="2"/>
+              <a:buChar char="§"/>
+            </a:pPr>
+            <a:r>
+              <a:rPr lang="de-DE" sz="2400" dirty="0" smtClean="0">
+                <a:latin typeface="Calibri" pitchFamily="34" charset="0"/>
+              </a:rPr>
+              <a:t>freie Alternativen: Python, Julia</a:t>
+            </a:r>
+          </a:p>
+        </p:txBody>
+      </p:sp>
+      <p:sp>
+        <p:nvSpPr>
+          <p:cNvPr id="6" name="Textfeld 5"/>
+          <p:cNvSpPr txBox="1"/>
+          <p:nvPr/>
+        </p:nvSpPr>
+        <p:spPr>
+          <a:xfrm>
+            <a:off x="395289" y="4941168"/>
+            <a:ext cx="8569324" cy="1200329"/>
+          </a:xfrm>
+          <a:prstGeom prst="rect">
+            <a:avLst/>
+          </a:prstGeom>
+          <a:noFill/>
+        </p:spPr>
+        <p:txBody>
+          <a:bodyPr wrap="square" rtlCol="0">
+            <a:spAutoFit/>
+          </a:bodyPr>
+          <a:lstStyle/>
+          <a:p>
+            <a:pPr algn="ctr"/>
+            <a:r>
+              <a:rPr lang="de-DE" sz="3600" dirty="0" smtClean="0">
+                <a:latin typeface="Calibri" pitchFamily="34" charset="0"/>
+              </a:rPr>
+              <a:t>R ist eine Sprache. </a:t>
+            </a:r>
+            <a:br>
+              <a:rPr lang="de-DE" sz="3600" dirty="0" smtClean="0">
+                <a:latin typeface="Calibri" pitchFamily="34" charset="0"/>
+              </a:rPr>
+            </a:br>
+            <a:r>
+              <a:rPr lang="de-DE" sz="3600" dirty="0" smtClean="0">
+                <a:latin typeface="Calibri" pitchFamily="34" charset="0"/>
+              </a:rPr>
+              <a:t>Sprachen lernt man </a:t>
+            </a:r>
+            <a:r>
+              <a:rPr lang="de-DE" sz="3600" dirty="0" err="1" smtClean="0">
+                <a:latin typeface="Calibri" pitchFamily="34" charset="0"/>
+              </a:rPr>
+              <a:t>durch‘s</a:t>
+            </a:r>
+            <a:r>
+              <a:rPr lang="de-DE" sz="3600" dirty="0" smtClean="0">
+                <a:latin typeface="Calibri" pitchFamily="34" charset="0"/>
+              </a:rPr>
+              <a:t> Sprechen!</a:t>
+            </a:r>
+            <a:endParaRPr lang="de-DE" sz="3600" dirty="0">
+              <a:latin typeface="Calibri" pitchFamily="34" charset="0"/>
+            </a:endParaRPr>
+          </a:p>
+        </p:txBody>
+      </p:sp>
+    </p:spTree>
+  </p:cSld>
+  <p:clrMapOvr>
+    <a:masterClrMapping/>
+  </p:clrMapOvr>
+  <p:transition>
+    <p:zoom/>
+  </p:transition>
+  <p:timing>
+    <p:tnLst>
+      <p:par>
+        <p:cTn id="1" dur="indefinite" restart="never" nodeType="tmRoot">
+          <p:childTnLst>
+            <p:seq concurrent="1" nextAc="seek">
+              <p:cTn id="2" dur="indefinite" nodeType="mainSeq">
+                <p:childTnLst>
+                  <p:par>
+                    <p:cTn id="3" fill="hold">
+                      <p:stCondLst>
+                        <p:cond delay="indefinite"/>
+                      </p:stCondLst>
+                      <p:childTnLst>
+                        <p:par>
+                          <p:cTn id="4" fill="hold">
+                            <p:stCondLst>
+                              <p:cond delay="0"/>
+                            </p:stCondLst>
+                            <p:childTnLst>
+                              <p:par>
+                                <p:cTn id="5" presetID="22" presetClass="entr" presetSubtype="1" fill="hold" grpId="0" nodeType="clickEffect">
+                                  <p:stCondLst>
+                                    <p:cond delay="0"/>
+                                  </p:stCondLst>
+                                  <p:childTnLst>
+                                    <p:set>
+                                      <p:cBhvr>
+                                        <p:cTn id="6" dur="1" fill="hold">
+                                          <p:stCondLst>
+                                            <p:cond delay="0"/>
+                                          </p:stCondLst>
+                                        </p:cTn>
+                                        <p:tgtEl>
+                                          <p:spTgt spid="5"/>
+                                        </p:tgtEl>
+                                        <p:attrNameLst>
+                                          <p:attrName>style.visibility</p:attrName>
+                                        </p:attrNameLst>
+                                      </p:cBhvr>
+                                      <p:to>
+                                        <p:strVal val="visible"/>
+                                      </p:to>
+                                    </p:set>
+                                    <p:animEffect transition="in" filter="wipe(up)">
+                                      <p:cBhvr>
+                                        <p:cTn id="7" dur="500"/>
+                                        <p:tgtEl>
+                                          <p:spTgt spid="5"/>
+                                        </p:tgtEl>
+                                      </p:cBhvr>
+                                    </p:animEffect>
+                                  </p:childTnLst>
+                                </p:cTn>
+                              </p:par>
+                            </p:childTnLst>
+                          </p:cTn>
+                        </p:par>
+                      </p:childTnLst>
+                    </p:cTn>
+                  </p:par>
+                  <p:par>
+                    <p:cTn id="8" fill="hold">
+                      <p:stCondLst>
+                        <p:cond delay="indefinite"/>
+                      </p:stCondLst>
+                      <p:childTnLst>
+                        <p:par>
+                          <p:cTn id="9" fill="hold">
+                            <p:stCondLst>
+                              <p:cond delay="0"/>
+                            </p:stCondLst>
+                            <p:childTnLst>
+                              <p:par>
+                                <p:cTn id="10" presetID="23" presetClass="entr" presetSubtype="288" fill="hold" grpId="0" nodeType="clickEffect">
+                                  <p:stCondLst>
+                                    <p:cond delay="0"/>
+                                  </p:stCondLst>
+                                  <p:childTnLst>
+                                    <p:set>
+                                      <p:cBhvr>
+                                        <p:cTn id="11" dur="1" fill="hold">
+                                          <p:stCondLst>
+                                            <p:cond delay="0"/>
+                                          </p:stCondLst>
+                                        </p:cTn>
+                                        <p:tgtEl>
+                                          <p:spTgt spid="6"/>
+                                        </p:tgtEl>
+                                        <p:attrNameLst>
+                                          <p:attrName>style.visibility</p:attrName>
+                                        </p:attrNameLst>
+                                      </p:cBhvr>
+                                      <p:to>
+                                        <p:strVal val="visible"/>
+                                      </p:to>
+                                    </p:set>
+                                    <p:anim calcmode="lin" valueType="num">
+                                      <p:cBhvr>
+                                        <p:cTn id="12" dur="500" fill="hold"/>
+                                        <p:tgtEl>
+                                          <p:spTgt spid="6"/>
+                                        </p:tgtEl>
+                                        <p:attrNameLst>
+                                          <p:attrName>ppt_w</p:attrName>
+                                        </p:attrNameLst>
+                                      </p:cBhvr>
+                                      <p:tavLst>
+                                        <p:tav tm="0">
+                                          <p:val>
+                                            <p:strVal val="4/3*#ppt_w"/>
+                                          </p:val>
+                                        </p:tav>
+                                        <p:tav tm="100000">
+                                          <p:val>
+                                            <p:strVal val="#ppt_w"/>
+                                          </p:val>
+                                        </p:tav>
+                                      </p:tavLst>
+                                    </p:anim>
+                                    <p:anim calcmode="lin" valueType="num">
+                                      <p:cBhvr>
+                                        <p:cTn id="13" dur="500" fill="hold"/>
+                                        <p:tgtEl>
+                                          <p:spTgt spid="6"/>
+                                        </p:tgtEl>
+                                        <p:attrNameLst>
+                                          <p:attrName>ppt_h</p:attrName>
+                                        </p:attrNameLst>
+                                      </p:cBhvr>
+                                      <p:tavLst>
+                                        <p:tav tm="0">
+                                          <p:val>
+                                            <p:strVal val="4/3*#ppt_h"/>
+                                          </p:val>
+                                        </p:tav>
+                                        <p:tav tm="100000">
+                                          <p:val>
+                                            <p:strVal val="#ppt_h"/>
+                                          </p:val>
+                                        </p:tav>
+                                      </p:tavLst>
+                                    </p:anim>
+                                  </p:childTnLst>
+                                </p:cTn>
+                              </p:par>
+                            </p:childTnLst>
+                          </p:cTn>
+                        </p:par>
+                      </p:childTnLst>
+                    </p:cTn>
+                  </p:par>
+                </p:childTnLst>
+              </p:cTn>
+              <p:prevCondLst>
+                <p:cond evt="onPrev" delay="0">
+                  <p:tgtEl>
+                    <p:sldTgt/>
+                  </p:tgtEl>
+                </p:cond>
+              </p:prevCondLst>
+              <p:nextCondLst>
+                <p:cond evt="onNext" delay="0">
+                  <p:tgtEl>
+                    <p:sldTgt/>
+                  </p:tgtEl>
+                </p:cond>
+              </p:nextCondLst>
+            </p:seq>
+          </p:childTnLst>
+        </p:cTn>
+      </p:par>
+    </p:tnLst>
+    <p:bldLst>
+      <p:bldP spid="5" grpId="0"/>
+      <p:bldP spid="6" grpId="0"/>
+    </p:bldLst>
+  </p:timing>
+</p:sld>
+</file>
+
+<file path=ppt/slides/slide11.xml><?xml version="1.0" encoding="utf-8"?>
+<p:sld xmlns:a="http://schemas.openxmlformats.org/drawingml/2006/main" xmlns:r="http://schemas.openxmlformats.org/officeDocument/2006/relationships" xmlns:p="http://schemas.openxmlformats.org/presentationml/2006/main">
+  <p:cSld>
+    <p:spTree>
+      <p:nvGrpSpPr>
+        <p:cNvPr id="1" name=""/>
+        <p:cNvGrpSpPr/>
+        <p:nvPr/>
+      </p:nvGrpSpPr>
+      <p:grpSpPr>
+        <a:xfrm>
+          <a:off x="0" y="0"/>
+          <a:ext cx="0" cy="0"/>
+          <a:chOff x="0" y="0"/>
+          <a:chExt cx="0" cy="0"/>
+        </a:xfrm>
+      </p:grpSpPr>
+      <p:sp>
+        <p:nvSpPr>
+          <p:cNvPr id="13" name="Textfeld 12"/>
+          <p:cNvSpPr txBox="1"/>
+          <p:nvPr/>
+        </p:nvSpPr>
+        <p:spPr>
+          <a:xfrm>
+            <a:off x="1" y="-21515"/>
+            <a:ext cx="9108504" cy="476250"/>
+          </a:xfrm>
+          <a:prstGeom prst="rect">
+            <a:avLst/>
+          </a:prstGeom>
+          <a:noFill/>
+          <a:effectLst/>
+        </p:spPr>
+        <p:txBody>
+          <a:bodyPr wrap="square" lIns="0" rIns="0" rtlCol="0">
+            <a:noAutofit/>
+          </a:bodyPr>
+          <a:lstStyle/>
+          <a:p>
+            <a:pPr algn="ctr">
+              <a:spcAft>
+                <a:spcPts val="0"/>
+              </a:spcAft>
+              <a:defRPr/>
+            </a:pPr>
+            <a:r>
+              <a:rPr lang="de-DE" sz="2800" dirty="0" smtClean="0">
+                <a:solidFill>
+                  <a:schemeClr val="bg1">
+                    <a:lumMod val="85000"/>
+                  </a:schemeClr>
+                </a:solidFill>
+                <a:latin typeface="Calibri" pitchFamily="34" charset="0"/>
+              </a:rPr>
+              <a:t>Warum R? </a:t>
+            </a:r>
+          </a:p>
+        </p:txBody>
+      </p:sp>
+      <p:pic>
+        <p:nvPicPr>
           <p:cNvPr id="58370" name="Picture 2"/>
           <p:cNvPicPr>
             <a:picLocks noChangeAspect="1" noChangeArrowheads="1"/>
@@ -5853,7 +6392,7 @@
 </p:sld>
 </file>
 
-<file path=ppt/slides/slide11.xml><?xml version="1.0" encoding="utf-8"?>
+<file path=ppt/slides/slide12.xml><?xml version="1.0" encoding="utf-8"?>
 <p:sld xmlns:a="http://schemas.openxmlformats.org/drawingml/2006/main" xmlns:r="http://schemas.openxmlformats.org/officeDocument/2006/relationships" xmlns:p="http://schemas.openxmlformats.org/presentationml/2006/main">
   <p:cSld>
     <p:spTree>
@@ -6221,7 +6760,7 @@
 </p:sld>
 </file>
 
-<file path=ppt/slides/slide12.xml><?xml version="1.0" encoding="utf-8"?>
+<file path=ppt/slides/slide13.xml><?xml version="1.0" encoding="utf-8"?>
 <p:sld xmlns:a="http://schemas.openxmlformats.org/drawingml/2006/main" xmlns:r="http://schemas.openxmlformats.org/officeDocument/2006/relationships" xmlns:p="http://schemas.openxmlformats.org/presentationml/2006/main">
   <p:cSld>
     <p:spTree>
@@ -6363,7 +6902,7 @@
 </p:sld>
 </file>
 
-<file path=ppt/slides/slide13.xml><?xml version="1.0" encoding="utf-8"?>
+<file path=ppt/slides/slide14.xml><?xml version="1.0" encoding="utf-8"?>
 <p:sld xmlns:a="http://schemas.openxmlformats.org/drawingml/2006/main" xmlns:r="http://schemas.openxmlformats.org/officeDocument/2006/relationships" xmlns:p="http://schemas.openxmlformats.org/presentationml/2006/main">
   <p:cSld>
     <p:spTree>
@@ -6688,7 +7227,7 @@
 </p:sld>
 </file>
 
-<file path=ppt/slides/slide14.xml><?xml version="1.0" encoding="utf-8"?>
+<file path=ppt/slides/slide15.xml><?xml version="1.0" encoding="utf-8"?>
 <p:sld xmlns:a="http://schemas.openxmlformats.org/drawingml/2006/main" xmlns:r="http://schemas.openxmlformats.org/officeDocument/2006/relationships" xmlns:p="http://schemas.openxmlformats.org/presentationml/2006/main">
   <p:cSld>
     <p:spTree>
@@ -6795,530 +7334,6 @@
               </a:rPr>
               <a:t> Fight </a:t>
             </a:r>
-          </a:p>
-        </p:txBody>
-      </p:sp>
-    </p:spTree>
-  </p:cSld>
-  <p:clrMapOvr>
-    <a:masterClrMapping/>
-  </p:clrMapOvr>
-  <p:transition>
-    <p:zoom/>
-  </p:transition>
-  <p:timing>
-    <p:tnLst>
-      <p:par>
-        <p:cTn id="1" dur="indefinite" restart="never" nodeType="tmRoot"/>
-      </p:par>
-    </p:tnLst>
-  </p:timing>
-</p:sld>
-</file>
-
-<file path=ppt/slides/slide15.xml><?xml version="1.0" encoding="utf-8"?>
-<p:sld xmlns:a="http://schemas.openxmlformats.org/drawingml/2006/main" xmlns:r="http://schemas.openxmlformats.org/officeDocument/2006/relationships" xmlns:p="http://schemas.openxmlformats.org/presentationml/2006/main">
-  <p:cSld>
-    <p:spTree>
-      <p:nvGrpSpPr>
-        <p:cNvPr id="1" name=""/>
-        <p:cNvGrpSpPr/>
-        <p:nvPr/>
-      </p:nvGrpSpPr>
-      <p:grpSpPr>
-        <a:xfrm>
-          <a:off x="0" y="0"/>
-          <a:ext cx="0" cy="0"/>
-          <a:chOff x="0" y="0"/>
-          <a:chExt cx="0" cy="0"/>
-        </a:xfrm>
-      </p:grpSpPr>
-      <p:sp>
-        <p:nvSpPr>
-          <p:cNvPr id="13" name="Textfeld 12"/>
-          <p:cNvSpPr txBox="1"/>
-          <p:nvPr/>
-        </p:nvSpPr>
-        <p:spPr>
-          <a:xfrm>
-            <a:off x="1" y="-21515"/>
-            <a:ext cx="9108504" cy="476250"/>
-          </a:xfrm>
-          <a:prstGeom prst="rect">
-            <a:avLst/>
-          </a:prstGeom>
-          <a:noFill/>
-          <a:effectLst/>
-        </p:spPr>
-        <p:txBody>
-          <a:bodyPr wrap="square" lIns="0" rIns="0" rtlCol="0">
-            <a:noAutofit/>
-          </a:bodyPr>
-          <a:lstStyle/>
-          <a:p>
-            <a:pPr algn="ctr">
-              <a:spcAft>
-                <a:spcPts val="0"/>
-              </a:spcAft>
-              <a:defRPr/>
-            </a:pPr>
-            <a:r>
-              <a:rPr lang="de-DE" sz="2800" dirty="0" err="1" smtClean="0">
-                <a:solidFill>
-                  <a:schemeClr val="bg1">
-                    <a:lumMod val="85000"/>
-                  </a:schemeClr>
-                </a:solidFill>
-                <a:latin typeface="Calibri" pitchFamily="34" charset="0"/>
-              </a:rPr>
-              <a:t>You</a:t>
-            </a:r>
-            <a:r>
-              <a:rPr lang="de-DE" sz="2800" dirty="0" smtClean="0">
-                <a:solidFill>
-                  <a:schemeClr val="bg1">
-                    <a:lumMod val="85000"/>
-                  </a:schemeClr>
-                </a:solidFill>
-                <a:latin typeface="Calibri" pitchFamily="34" charset="0"/>
-              </a:rPr>
-              <a:t>  </a:t>
-            </a:r>
-            <a:r>
-              <a:rPr lang="de-DE" sz="2800" dirty="0" err="1" smtClean="0">
-                <a:solidFill>
-                  <a:schemeClr val="bg1">
-                    <a:lumMod val="85000"/>
-                  </a:schemeClr>
-                </a:solidFill>
-                <a:latin typeface="Calibri" pitchFamily="34" charset="0"/>
-              </a:rPr>
-              <a:t>Gotta</a:t>
-            </a:r>
-            <a:r>
-              <a:rPr lang="de-DE" sz="2800" dirty="0" smtClean="0">
-                <a:solidFill>
-                  <a:schemeClr val="bg1">
-                    <a:lumMod val="85000"/>
-                  </a:schemeClr>
-                </a:solidFill>
-                <a:latin typeface="Calibri" pitchFamily="34" charset="0"/>
-              </a:rPr>
-              <a:t> </a:t>
-            </a:r>
-            <a:r>
-              <a:rPr lang="de-DE" sz="2800" dirty="0" err="1" smtClean="0">
-                <a:solidFill>
-                  <a:schemeClr val="bg1">
-                    <a:lumMod val="85000"/>
-                  </a:schemeClr>
-                </a:solidFill>
-                <a:latin typeface="Calibri" pitchFamily="34" charset="0"/>
-              </a:rPr>
-              <a:t>Fight</a:t>
-            </a:r>
-            <a:r>
-              <a:rPr lang="de-DE" sz="2800" dirty="0" smtClean="0">
-                <a:solidFill>
-                  <a:schemeClr val="bg1">
-                    <a:lumMod val="85000"/>
-                  </a:schemeClr>
-                </a:solidFill>
-                <a:latin typeface="Calibri" pitchFamily="34" charset="0"/>
-              </a:rPr>
-              <a:t> </a:t>
-            </a:r>
-          </a:p>
-        </p:txBody>
-      </p:sp>
-      <p:sp>
-        <p:nvSpPr>
-          <p:cNvPr id="3" name="Textfeld 2"/>
-          <p:cNvSpPr txBox="1"/>
-          <p:nvPr/>
-        </p:nvSpPr>
-        <p:spPr>
-          <a:xfrm>
-            <a:off x="395288" y="548680"/>
-            <a:ext cx="7345362" cy="523220"/>
-          </a:xfrm>
-          <a:prstGeom prst="rect">
-            <a:avLst/>
-          </a:prstGeom>
-          <a:noFill/>
-        </p:spPr>
-        <p:txBody>
-          <a:bodyPr wrap="square" rtlCol="0">
-            <a:spAutoFit/>
-          </a:bodyPr>
-          <a:lstStyle/>
-          <a:p>
-            <a:r>
-              <a:rPr lang="de-DE" sz="2800" dirty="0" smtClean="0">
-                <a:latin typeface="Calibri" pitchFamily="34" charset="0"/>
-              </a:rPr>
-              <a:t>1. Gehe zu </a:t>
-            </a:r>
-            <a:r>
-              <a:rPr lang="de-DE" sz="2800" dirty="0" smtClean="0">
-                <a:latin typeface="Calibri" pitchFamily="34" charset="0"/>
-                <a:hlinkClick r:id="rId3"/>
-              </a:rPr>
-              <a:t>https://codefights.com</a:t>
-            </a:r>
-            <a:r>
-              <a:rPr lang="de-DE" sz="2800" dirty="0" smtClean="0">
-                <a:latin typeface="Calibri" pitchFamily="34" charset="0"/>
-              </a:rPr>
-              <a:t> </a:t>
-            </a:r>
-            <a:endParaRPr lang="de-DE" sz="2800" dirty="0">
-              <a:latin typeface="Calibri" pitchFamily="34" charset="0"/>
-            </a:endParaRPr>
-          </a:p>
-        </p:txBody>
-      </p:sp>
-      <p:pic>
-        <p:nvPicPr>
-          <p:cNvPr id="2049" name="Picture 1"/>
-          <p:cNvPicPr>
-            <a:picLocks noChangeAspect="1" noChangeArrowheads="1"/>
-          </p:cNvPicPr>
-          <p:nvPr/>
-        </p:nvPicPr>
-        <p:blipFill>
-          <a:blip r:embed="rId4" cstate="print"/>
-          <a:srcRect/>
-          <a:stretch>
-            <a:fillRect/>
-          </a:stretch>
-        </p:blipFill>
-        <p:spPr bwMode="auto">
-          <a:xfrm>
-            <a:off x="539552" y="1052736"/>
-            <a:ext cx="4411480" cy="1944787"/>
-          </a:xfrm>
-          <a:prstGeom prst="rect">
-            <a:avLst/>
-          </a:prstGeom>
-          <a:noFill/>
-          <a:ln w="9525">
-            <a:noFill/>
-            <a:miter lim="800000"/>
-            <a:headEnd/>
-            <a:tailEnd/>
-          </a:ln>
-        </p:spPr>
-      </p:pic>
-      <p:sp>
-        <p:nvSpPr>
-          <p:cNvPr id="5" name="Ellipse 4"/>
-          <p:cNvSpPr/>
-          <p:nvPr/>
-        </p:nvSpPr>
-        <p:spPr bwMode="auto">
-          <a:xfrm>
-            <a:off x="1893648" y="2748654"/>
-            <a:ext cx="1512168" cy="669588"/>
-          </a:xfrm>
-          <a:prstGeom prst="ellipse">
-            <a:avLst/>
-          </a:prstGeom>
-          <a:noFill/>
-          <a:ln w="57150" cap="flat" cmpd="sng" algn="ctr">
-            <a:solidFill>
-              <a:schemeClr val="bg1"/>
-            </a:solidFill>
-            <a:prstDash val="solid"/>
-            <a:round/>
-            <a:headEnd type="none" w="med" len="med"/>
-            <a:tailEnd type="none" w="med" len="med"/>
-          </a:ln>
-          <a:effectLst/>
-        </p:spPr>
-        <p:txBody>
-          <a:bodyPr vert="horz" wrap="square" lIns="91440" tIns="45720" rIns="91440" bIns="45720" numCol="1" rtlCol="0" anchor="t" anchorCtr="0" compatLnSpc="1">
-            <a:prstTxWarp prst="textNoShape">
-              <a:avLst/>
-            </a:prstTxWarp>
-          </a:bodyPr>
-          <a:lstStyle/>
-          <a:p>
-            <a:pPr marL="0" marR="0" indent="0" algn="l" defTabSz="914400" rtl="0" eaLnBrk="1" fontAlgn="base" latinLnBrk="0" hangingPunct="1">
-              <a:lnSpc>
-                <a:spcPct val="100000"/>
-              </a:lnSpc>
-              <a:spcBef>
-                <a:spcPct val="0"/>
-              </a:spcBef>
-              <a:spcAft>
-                <a:spcPct val="0"/>
-              </a:spcAft>
-              <a:buClrTx/>
-              <a:buSzTx/>
-              <a:buFontTx/>
-              <a:buNone/>
-              <a:tabLst/>
-            </a:pPr>
-            <a:endParaRPr kumimoji="0" lang="de-DE" sz="1600" b="0" i="0" u="none" strike="noStrike" cap="none" normalizeH="0" baseline="0" smtClean="0">
-              <a:ln>
-                <a:noFill/>
-              </a:ln>
-              <a:solidFill>
-                <a:schemeClr val="tx1"/>
-              </a:solidFill>
-              <a:effectLst/>
-              <a:latin typeface="Arial" charset="0"/>
-            </a:endParaRPr>
-          </a:p>
-        </p:txBody>
-      </p:sp>
-      <p:pic>
-        <p:nvPicPr>
-          <p:cNvPr id="2051" name="Picture 3"/>
-          <p:cNvPicPr>
-            <a:picLocks noChangeAspect="1" noChangeArrowheads="1"/>
-          </p:cNvPicPr>
-          <p:nvPr/>
-        </p:nvPicPr>
-        <p:blipFill>
-          <a:blip r:embed="rId5" cstate="print"/>
-          <a:srcRect/>
-          <a:stretch>
-            <a:fillRect/>
-          </a:stretch>
-        </p:blipFill>
-        <p:spPr bwMode="auto">
-          <a:xfrm>
-            <a:off x="5940035" y="734566"/>
-            <a:ext cx="2880437" cy="5430738"/>
-          </a:xfrm>
-          <a:prstGeom prst="rect">
-            <a:avLst/>
-          </a:prstGeom>
-          <a:noFill/>
-          <a:ln w="28575">
-            <a:solidFill>
-              <a:schemeClr val="bg1">
-                <a:lumMod val="50000"/>
-              </a:schemeClr>
-            </a:solidFill>
-            <a:miter lim="800000"/>
-            <a:headEnd/>
-            <a:tailEnd/>
-          </a:ln>
-        </p:spPr>
-      </p:pic>
-      <p:sp>
-        <p:nvSpPr>
-          <p:cNvPr id="8" name="Textfeld 7"/>
-          <p:cNvSpPr txBox="1"/>
-          <p:nvPr/>
-        </p:nvSpPr>
-        <p:spPr>
-          <a:xfrm>
-            <a:off x="395536" y="3068960"/>
-            <a:ext cx="5113635" cy="954107"/>
-          </a:xfrm>
-          <a:prstGeom prst="rect">
-            <a:avLst/>
-          </a:prstGeom>
-          <a:noFill/>
-        </p:spPr>
-        <p:txBody>
-          <a:bodyPr wrap="square" rtlCol="0">
-            <a:spAutoFit/>
-          </a:bodyPr>
-          <a:lstStyle/>
-          <a:p>
-            <a:r>
-              <a:rPr lang="de-DE" sz="2800" dirty="0" smtClean="0">
-                <a:latin typeface="Calibri" pitchFamily="34" charset="0"/>
-              </a:rPr>
-              <a:t>2. </a:t>
-            </a:r>
-            <a:r>
-              <a:rPr lang="de-DE" sz="2800" dirty="0" smtClean="0">
-                <a:latin typeface="Calibri" pitchFamily="34" charset="0"/>
-              </a:rPr>
-              <a:t>E-Mail mit gewähltem Nutzernamen an </a:t>
-            </a:r>
-            <a:r>
-              <a:rPr lang="de-DE" sz="2800" dirty="0" err="1" smtClean="0">
-                <a:latin typeface="Calibri" pitchFamily="34" charset="0"/>
-              </a:rPr>
-              <a:t>francke@uni</a:t>
-            </a:r>
-            <a:r>
-              <a:rPr lang="de-DE" sz="2800" dirty="0" smtClean="0">
-                <a:latin typeface="Calibri" pitchFamily="34" charset="0"/>
-              </a:rPr>
-              <a:t>-... </a:t>
-            </a:r>
-            <a:endParaRPr lang="de-DE" sz="2800" dirty="0">
-              <a:latin typeface="Calibri" pitchFamily="34" charset="0"/>
-            </a:endParaRPr>
-          </a:p>
-        </p:txBody>
-      </p:sp>
-      <p:sp>
-        <p:nvSpPr>
-          <p:cNvPr id="9" name="Textfeld 8"/>
-          <p:cNvSpPr txBox="1"/>
-          <p:nvPr/>
-        </p:nvSpPr>
-        <p:spPr>
-          <a:xfrm>
-            <a:off x="395536" y="4174048"/>
-            <a:ext cx="5113635" cy="1323439"/>
-          </a:xfrm>
-          <a:prstGeom prst="rect">
-            <a:avLst/>
-          </a:prstGeom>
-          <a:noFill/>
-        </p:spPr>
-        <p:txBody>
-          <a:bodyPr wrap="square" rtlCol="0">
-            <a:spAutoFit/>
-          </a:bodyPr>
-          <a:lstStyle/>
-          <a:p>
-            <a:r>
-              <a:rPr lang="de-DE" sz="2800" dirty="0" smtClean="0">
-                <a:latin typeface="Calibri" pitchFamily="34" charset="0"/>
-              </a:rPr>
-              <a:t>3</a:t>
-            </a:r>
-            <a:r>
-              <a:rPr lang="de-DE" sz="2800" dirty="0" smtClean="0">
-                <a:latin typeface="Calibri" pitchFamily="34" charset="0"/>
-              </a:rPr>
-              <a:t>. </a:t>
-            </a:r>
-            <a:r>
-              <a:rPr lang="de-DE" sz="2800" dirty="0" smtClean="0">
-                <a:latin typeface="Calibri" pitchFamily="34" charset="0"/>
-              </a:rPr>
-              <a:t>Gehe zur </a:t>
-            </a:r>
-            <a:r>
-              <a:rPr lang="de-DE" sz="2800" dirty="0" err="1" smtClean="0">
-                <a:latin typeface="Calibri" pitchFamily="34" charset="0"/>
-              </a:rPr>
-              <a:t>Moodle</a:t>
-            </a:r>
-            <a:r>
-              <a:rPr lang="de-DE" sz="2800" dirty="0" smtClean="0">
-                <a:latin typeface="Calibri" pitchFamily="34" charset="0"/>
-              </a:rPr>
-              <a:t>-Kursseite</a:t>
-            </a:r>
-            <a:br>
-              <a:rPr lang="de-DE" sz="2800" dirty="0" smtClean="0">
-                <a:latin typeface="Calibri" pitchFamily="34" charset="0"/>
-              </a:rPr>
-            </a:br>
-            <a:r>
-              <a:rPr lang="de-DE" sz="2800" dirty="0" smtClean="0">
-                <a:latin typeface="Calibri" pitchFamily="34" charset="0"/>
-              </a:rPr>
-              <a:t>und </a:t>
-            </a:r>
-            <a:r>
-              <a:rPr lang="de-DE" sz="2800" dirty="0" smtClean="0">
-                <a:latin typeface="Calibri" pitchFamily="34" charset="0"/>
-              </a:rPr>
-              <a:t>starte das Turnier: </a:t>
-            </a:r>
-            <a:r>
-              <a:rPr lang="de-DE" sz="2400" u="sng" dirty="0" smtClean="0">
-                <a:solidFill>
-                  <a:schemeClr val="accent2"/>
-                </a:solidFill>
-                <a:latin typeface="Calibri" pitchFamily="34" charset="0"/>
-              </a:rPr>
-              <a:t>http://</a:t>
-            </a:r>
-            <a:r>
-              <a:rPr lang="de-DE" sz="2400" u="sng" dirty="0" smtClean="0">
-                <a:solidFill>
-                  <a:schemeClr val="accent2"/>
-                </a:solidFill>
-                <a:latin typeface="Calibri" pitchFamily="34" charset="0"/>
-              </a:rPr>
-              <a:t>tinyurl.com/einfmod-1</a:t>
-            </a:r>
-            <a:endParaRPr lang="de-DE" sz="2400" u="sng" dirty="0">
-              <a:solidFill>
-                <a:schemeClr val="accent2"/>
-              </a:solidFill>
-              <a:latin typeface="Calibri" pitchFamily="34" charset="0"/>
-            </a:endParaRPr>
-          </a:p>
-        </p:txBody>
-      </p:sp>
-      <p:sp>
-        <p:nvSpPr>
-          <p:cNvPr id="10" name="Rechteck 9"/>
-          <p:cNvSpPr/>
-          <p:nvPr/>
-        </p:nvSpPr>
-        <p:spPr bwMode="auto">
-          <a:xfrm>
-            <a:off x="251520" y="476672"/>
-            <a:ext cx="5544616" cy="3600400"/>
-          </a:xfrm>
-          <a:prstGeom prst="rect">
-            <a:avLst/>
-          </a:prstGeom>
-          <a:solidFill>
-            <a:schemeClr val="bg1">
-              <a:alpha val="69000"/>
-            </a:schemeClr>
-          </a:solidFill>
-          <a:ln w="19050" cap="flat" cmpd="sng" algn="ctr">
-            <a:noFill/>
-            <a:prstDash val="solid"/>
-            <a:round/>
-            <a:headEnd type="none" w="med" len="med"/>
-            <a:tailEnd type="none" w="med" len="med"/>
-          </a:ln>
-          <a:effectLst/>
-        </p:spPr>
-        <p:txBody>
-          <a:bodyPr vert="horz" wrap="square" lIns="91440" tIns="45720" rIns="91440" bIns="45720" numCol="1" rtlCol="0" anchor="t" anchorCtr="0" compatLnSpc="1">
-            <a:prstTxWarp prst="textNoShape">
-              <a:avLst/>
-            </a:prstTxWarp>
-          </a:bodyPr>
-          <a:lstStyle/>
-          <a:p>
-            <a:pPr marL="0" marR="0" indent="0" algn="l" defTabSz="914400" rtl="0" eaLnBrk="1" fontAlgn="base" latinLnBrk="0" hangingPunct="1">
-              <a:lnSpc>
-                <a:spcPct val="100000"/>
-              </a:lnSpc>
-              <a:spcBef>
-                <a:spcPct val="0"/>
-              </a:spcBef>
-              <a:spcAft>
-                <a:spcPct val="0"/>
-              </a:spcAft>
-              <a:buClrTx/>
-              <a:buSzTx/>
-              <a:buFontTx/>
-              <a:buNone/>
-              <a:tabLst/>
-            </a:pPr>
-            <a:endParaRPr kumimoji="0" lang="en-GB" sz="1600" b="0" i="0" u="none" strike="noStrike" cap="none" normalizeH="0" baseline="0" smtClean="0">
-              <a:ln>
-                <a:noFill/>
-              </a:ln>
-              <a:solidFill>
-                <a:schemeClr val="tx1"/>
-              </a:solidFill>
-              <a:effectLst/>
-              <a:latin typeface="Arial" charset="0"/>
-            </a:endParaRPr>
           </a:p>
         </p:txBody>
       </p:sp>
@@ -8260,14 +8275,6 @@
               </a:rPr>
               <a:t>Terminverschiebung</a:t>
             </a:r>
-            <a:endParaRPr lang="de-DE" sz="2800" dirty="0" smtClean="0">
-              <a:solidFill>
-                <a:schemeClr val="bg1">
-                  <a:lumMod val="85000"/>
-                </a:schemeClr>
-              </a:solidFill>
-              <a:latin typeface="Calibri" pitchFamily="34" charset="0"/>
-            </a:endParaRPr>
           </a:p>
         </p:txBody>
       </p:sp>
@@ -8327,9 +8334,6 @@
               </a:rPr>
               <a:t> Donnerstag, 10:15-11:45</a:t>
             </a:r>
-            <a:endParaRPr lang="de-DE" sz="2800" dirty="0" smtClean="0">
-              <a:latin typeface="Calibri" pitchFamily="34" charset="0"/>
-            </a:endParaRPr>
           </a:p>
           <a:p>
             <a:pPr lvl="1">
@@ -8349,12 +8353,25 @@
               <a:buChar char="•"/>
             </a:pPr>
             <a:r>
-              <a:rPr lang="de-DE" sz="2800" dirty="0" smtClean="0">
+              <a:rPr lang="de-DE" sz="2800" b="1" u="sng" dirty="0" smtClean="0">
                 <a:latin typeface="Calibri" pitchFamily="34" charset="0"/>
               </a:rPr>
-              <a:t> 5.1.2017</a:t>
-            </a:r>
-            <a:endParaRPr lang="de-DE" sz="2800" dirty="0" smtClean="0">
+              <a:t> </a:t>
+            </a:r>
+            <a:r>
+              <a:rPr lang="de-DE" sz="2800" b="1" u="sng" dirty="0" smtClean="0">
+                <a:latin typeface="Calibri" pitchFamily="34" charset="0"/>
+              </a:rPr>
+              <a:t>5.1.2017  </a:t>
+            </a:r>
+            <a:r>
+              <a:rPr lang="de-DE" sz="2800" b="1" u="sng" smtClean="0">
+                <a:latin typeface="Calibri" pitchFamily="34" charset="0"/>
+                <a:sym typeface="Wingdings" pitchFamily="2" charset="2"/>
+              </a:rPr>
+              <a:t> gewählt</a:t>
+            </a:r>
+            <a:endParaRPr lang="de-DE" sz="2800" b="1" u="sng" dirty="0" smtClean="0">
               <a:latin typeface="Calibri" pitchFamily="34" charset="0"/>
             </a:endParaRPr>
           </a:p>
@@ -8794,6 +8811,515 @@
 </file>
 
 <file path=ppt/slides/slide6.xml><?xml version="1.0" encoding="utf-8"?>
+<p:sld xmlns:a="http://schemas.openxmlformats.org/drawingml/2006/main" xmlns:r="http://schemas.openxmlformats.org/officeDocument/2006/relationships" xmlns:p="http://schemas.openxmlformats.org/presentationml/2006/main">
+  <p:cSld>
+    <p:spTree>
+      <p:nvGrpSpPr>
+        <p:cNvPr id="1" name=""/>
+        <p:cNvGrpSpPr/>
+        <p:nvPr/>
+      </p:nvGrpSpPr>
+      <p:grpSpPr>
+        <a:xfrm>
+          <a:off x="0" y="0"/>
+          <a:ext cx="0" cy="0"/>
+          <a:chOff x="0" y="0"/>
+          <a:chExt cx="0" cy="0"/>
+        </a:xfrm>
+      </p:grpSpPr>
+      <p:sp>
+        <p:nvSpPr>
+          <p:cNvPr id="13" name="Textfeld 12"/>
+          <p:cNvSpPr txBox="1"/>
+          <p:nvPr/>
+        </p:nvSpPr>
+        <p:spPr>
+          <a:xfrm>
+            <a:off x="1" y="-21515"/>
+            <a:ext cx="9108504" cy="476250"/>
+          </a:xfrm>
+          <a:prstGeom prst="rect">
+            <a:avLst/>
+          </a:prstGeom>
+          <a:noFill/>
+          <a:effectLst/>
+        </p:spPr>
+        <p:txBody>
+          <a:bodyPr wrap="square" lIns="0" rIns="0" rtlCol="0">
+            <a:noAutofit/>
+          </a:bodyPr>
+          <a:lstStyle/>
+          <a:p>
+            <a:pPr algn="ctr">
+              <a:spcAft>
+                <a:spcPts val="0"/>
+              </a:spcAft>
+              <a:defRPr/>
+            </a:pPr>
+            <a:r>
+              <a:rPr lang="de-DE" sz="2800" dirty="0" err="1" smtClean="0">
+                <a:solidFill>
+                  <a:schemeClr val="bg1">
+                    <a:lumMod val="85000"/>
+                  </a:schemeClr>
+                </a:solidFill>
+                <a:latin typeface="Calibri" pitchFamily="34" charset="0"/>
+              </a:rPr>
+              <a:t>You</a:t>
+            </a:r>
+            <a:r>
+              <a:rPr lang="de-DE" sz="2800" dirty="0" smtClean="0">
+                <a:solidFill>
+                  <a:schemeClr val="bg1">
+                    <a:lumMod val="85000"/>
+                  </a:schemeClr>
+                </a:solidFill>
+                <a:latin typeface="Calibri" pitchFamily="34" charset="0"/>
+              </a:rPr>
+              <a:t>  </a:t>
+            </a:r>
+            <a:r>
+              <a:rPr lang="de-DE" sz="2800" dirty="0" err="1" smtClean="0">
+                <a:solidFill>
+                  <a:schemeClr val="bg1">
+                    <a:lumMod val="85000"/>
+                  </a:schemeClr>
+                </a:solidFill>
+                <a:latin typeface="Calibri" pitchFamily="34" charset="0"/>
+              </a:rPr>
+              <a:t>Gotta</a:t>
+            </a:r>
+            <a:r>
+              <a:rPr lang="de-DE" sz="2800" dirty="0" smtClean="0">
+                <a:solidFill>
+                  <a:schemeClr val="bg1">
+                    <a:lumMod val="85000"/>
+                  </a:schemeClr>
+                </a:solidFill>
+                <a:latin typeface="Calibri" pitchFamily="34" charset="0"/>
+              </a:rPr>
+              <a:t> </a:t>
+            </a:r>
+            <a:r>
+              <a:rPr lang="de-DE" sz="2800" dirty="0" err="1" smtClean="0">
+                <a:solidFill>
+                  <a:schemeClr val="bg1">
+                    <a:lumMod val="85000"/>
+                  </a:schemeClr>
+                </a:solidFill>
+                <a:latin typeface="Calibri" pitchFamily="34" charset="0"/>
+              </a:rPr>
+              <a:t>Fight</a:t>
+            </a:r>
+            <a:r>
+              <a:rPr lang="de-DE" sz="2800" dirty="0" smtClean="0">
+                <a:solidFill>
+                  <a:schemeClr val="bg1">
+                    <a:lumMod val="85000"/>
+                  </a:schemeClr>
+                </a:solidFill>
+                <a:latin typeface="Calibri" pitchFamily="34" charset="0"/>
+              </a:rPr>
+              <a:t> </a:t>
+            </a:r>
+          </a:p>
+        </p:txBody>
+      </p:sp>
+      <p:sp>
+        <p:nvSpPr>
+          <p:cNvPr id="3" name="Textfeld 2"/>
+          <p:cNvSpPr txBox="1"/>
+          <p:nvPr/>
+        </p:nvSpPr>
+        <p:spPr>
+          <a:xfrm>
+            <a:off x="395288" y="548680"/>
+            <a:ext cx="7345362" cy="523220"/>
+          </a:xfrm>
+          <a:prstGeom prst="rect">
+            <a:avLst/>
+          </a:prstGeom>
+          <a:noFill/>
+        </p:spPr>
+        <p:txBody>
+          <a:bodyPr wrap="square" rtlCol="0">
+            <a:spAutoFit/>
+          </a:bodyPr>
+          <a:lstStyle/>
+          <a:p>
+            <a:r>
+              <a:rPr lang="de-DE" sz="2800" dirty="0" smtClean="0">
+                <a:latin typeface="Calibri" pitchFamily="34" charset="0"/>
+              </a:rPr>
+              <a:t>1. Gehe zu </a:t>
+            </a:r>
+            <a:r>
+              <a:rPr lang="de-DE" sz="2800" dirty="0" smtClean="0">
+                <a:latin typeface="Calibri" pitchFamily="34" charset="0"/>
+                <a:hlinkClick r:id="rId3"/>
+              </a:rPr>
+              <a:t>https://codefights.com</a:t>
+            </a:r>
+            <a:r>
+              <a:rPr lang="de-DE" sz="2800" dirty="0" smtClean="0">
+                <a:latin typeface="Calibri" pitchFamily="34" charset="0"/>
+              </a:rPr>
+              <a:t> </a:t>
+            </a:r>
+            <a:endParaRPr lang="de-DE" sz="2800" dirty="0">
+              <a:latin typeface="Calibri" pitchFamily="34" charset="0"/>
+            </a:endParaRPr>
+          </a:p>
+        </p:txBody>
+      </p:sp>
+      <p:pic>
+        <p:nvPicPr>
+          <p:cNvPr id="2049" name="Picture 1"/>
+          <p:cNvPicPr>
+            <a:picLocks noChangeAspect="1" noChangeArrowheads="1"/>
+          </p:cNvPicPr>
+          <p:nvPr/>
+        </p:nvPicPr>
+        <p:blipFill>
+          <a:blip r:embed="rId4" cstate="print"/>
+          <a:srcRect/>
+          <a:stretch>
+            <a:fillRect/>
+          </a:stretch>
+        </p:blipFill>
+        <p:spPr bwMode="auto">
+          <a:xfrm>
+            <a:off x="539552" y="1052736"/>
+            <a:ext cx="4411480" cy="1944787"/>
+          </a:xfrm>
+          <a:prstGeom prst="rect">
+            <a:avLst/>
+          </a:prstGeom>
+          <a:noFill/>
+          <a:ln w="9525">
+            <a:noFill/>
+            <a:miter lim="800000"/>
+            <a:headEnd/>
+            <a:tailEnd/>
+          </a:ln>
+        </p:spPr>
+      </p:pic>
+      <p:sp>
+        <p:nvSpPr>
+          <p:cNvPr id="5" name="Ellipse 4"/>
+          <p:cNvSpPr/>
+          <p:nvPr/>
+        </p:nvSpPr>
+        <p:spPr bwMode="auto">
+          <a:xfrm>
+            <a:off x="1893648" y="2748654"/>
+            <a:ext cx="1512168" cy="669588"/>
+          </a:xfrm>
+          <a:prstGeom prst="ellipse">
+            <a:avLst/>
+          </a:prstGeom>
+          <a:noFill/>
+          <a:ln w="57150" cap="flat" cmpd="sng" algn="ctr">
+            <a:solidFill>
+              <a:schemeClr val="bg1"/>
+            </a:solidFill>
+            <a:prstDash val="solid"/>
+            <a:round/>
+            <a:headEnd type="none" w="med" len="med"/>
+            <a:tailEnd type="none" w="med" len="med"/>
+          </a:ln>
+          <a:effectLst/>
+        </p:spPr>
+        <p:txBody>
+          <a:bodyPr vert="horz" wrap="square" lIns="91440" tIns="45720" rIns="91440" bIns="45720" numCol="1" rtlCol="0" anchor="t" anchorCtr="0" compatLnSpc="1">
+            <a:prstTxWarp prst="textNoShape">
+              <a:avLst/>
+            </a:prstTxWarp>
+          </a:bodyPr>
+          <a:lstStyle/>
+          <a:p>
+            <a:pPr marL="0" marR="0" indent="0" algn="l" defTabSz="914400" rtl="0" eaLnBrk="1" fontAlgn="base" latinLnBrk="0" hangingPunct="1">
+              <a:lnSpc>
+                <a:spcPct val="100000"/>
+              </a:lnSpc>
+              <a:spcBef>
+                <a:spcPct val="0"/>
+              </a:spcBef>
+              <a:spcAft>
+                <a:spcPct val="0"/>
+              </a:spcAft>
+              <a:buClrTx/>
+              <a:buSzTx/>
+              <a:buFontTx/>
+              <a:buNone/>
+              <a:tabLst/>
+            </a:pPr>
+            <a:endParaRPr kumimoji="0" lang="de-DE" sz="1600" b="0" i="0" u="none" strike="noStrike" cap="none" normalizeH="0" baseline="0" smtClean="0">
+              <a:ln>
+                <a:noFill/>
+              </a:ln>
+              <a:solidFill>
+                <a:schemeClr val="tx1"/>
+              </a:solidFill>
+              <a:effectLst/>
+              <a:latin typeface="Arial" charset="0"/>
+            </a:endParaRPr>
+          </a:p>
+        </p:txBody>
+      </p:sp>
+      <p:pic>
+        <p:nvPicPr>
+          <p:cNvPr id="2051" name="Picture 3"/>
+          <p:cNvPicPr>
+            <a:picLocks noChangeAspect="1" noChangeArrowheads="1"/>
+          </p:cNvPicPr>
+          <p:nvPr/>
+        </p:nvPicPr>
+        <p:blipFill>
+          <a:blip r:embed="rId5" cstate="print"/>
+          <a:srcRect/>
+          <a:stretch>
+            <a:fillRect/>
+          </a:stretch>
+        </p:blipFill>
+        <p:spPr bwMode="auto">
+          <a:xfrm>
+            <a:off x="5940035" y="734566"/>
+            <a:ext cx="2880437" cy="5430738"/>
+          </a:xfrm>
+          <a:prstGeom prst="rect">
+            <a:avLst/>
+          </a:prstGeom>
+          <a:noFill/>
+          <a:ln w="28575">
+            <a:solidFill>
+              <a:schemeClr val="bg1">
+                <a:lumMod val="50000"/>
+              </a:schemeClr>
+            </a:solidFill>
+            <a:miter lim="800000"/>
+            <a:headEnd/>
+            <a:tailEnd/>
+          </a:ln>
+        </p:spPr>
+      </p:pic>
+      <p:sp>
+        <p:nvSpPr>
+          <p:cNvPr id="8" name="Textfeld 7"/>
+          <p:cNvSpPr txBox="1"/>
+          <p:nvPr/>
+        </p:nvSpPr>
+        <p:spPr>
+          <a:xfrm>
+            <a:off x="395536" y="3068960"/>
+            <a:ext cx="5113635" cy="954107"/>
+          </a:xfrm>
+          <a:prstGeom prst="rect">
+            <a:avLst/>
+          </a:prstGeom>
+          <a:noFill/>
+        </p:spPr>
+        <p:txBody>
+          <a:bodyPr wrap="square" rtlCol="0">
+            <a:spAutoFit/>
+          </a:bodyPr>
+          <a:lstStyle/>
+          <a:p>
+            <a:r>
+              <a:rPr lang="de-DE" sz="2800" dirty="0" smtClean="0">
+                <a:latin typeface="Calibri" pitchFamily="34" charset="0"/>
+              </a:rPr>
+              <a:t>2. E-Mail mit gewähltem Nutzernamen an </a:t>
+            </a:r>
+            <a:r>
+              <a:rPr lang="de-DE" sz="2800" dirty="0" err="1" smtClean="0">
+                <a:latin typeface="Calibri" pitchFamily="34" charset="0"/>
+              </a:rPr>
+              <a:t>francke@uni</a:t>
+            </a:r>
+            <a:r>
+              <a:rPr lang="de-DE" sz="2800" dirty="0" smtClean="0">
+                <a:latin typeface="Calibri" pitchFamily="34" charset="0"/>
+              </a:rPr>
+              <a:t>-... </a:t>
+            </a:r>
+            <a:endParaRPr lang="de-DE" sz="2800" dirty="0">
+              <a:latin typeface="Calibri" pitchFamily="34" charset="0"/>
+            </a:endParaRPr>
+          </a:p>
+        </p:txBody>
+      </p:sp>
+      <p:sp>
+        <p:nvSpPr>
+          <p:cNvPr id="9" name="Textfeld 8"/>
+          <p:cNvSpPr txBox="1"/>
+          <p:nvPr/>
+        </p:nvSpPr>
+        <p:spPr>
+          <a:xfrm>
+            <a:off x="395536" y="4174048"/>
+            <a:ext cx="5113635" cy="1323439"/>
+          </a:xfrm>
+          <a:prstGeom prst="rect">
+            <a:avLst/>
+          </a:prstGeom>
+          <a:noFill/>
+        </p:spPr>
+        <p:txBody>
+          <a:bodyPr wrap="square" rtlCol="0">
+            <a:spAutoFit/>
+          </a:bodyPr>
+          <a:lstStyle/>
+          <a:p>
+            <a:r>
+              <a:rPr lang="de-DE" sz="2800" dirty="0" smtClean="0">
+                <a:latin typeface="Calibri" pitchFamily="34" charset="0"/>
+              </a:rPr>
+              <a:t>3. Gehe zur </a:t>
+            </a:r>
+            <a:r>
+              <a:rPr lang="de-DE" sz="2800" dirty="0" err="1" smtClean="0">
+                <a:latin typeface="Calibri" pitchFamily="34" charset="0"/>
+              </a:rPr>
+              <a:t>Moodle</a:t>
+            </a:r>
+            <a:r>
+              <a:rPr lang="de-DE" sz="2800" dirty="0" smtClean="0">
+                <a:latin typeface="Calibri" pitchFamily="34" charset="0"/>
+              </a:rPr>
+              <a:t>-Kursseite</a:t>
+            </a:r>
+            <a:br>
+              <a:rPr lang="de-DE" sz="2800" dirty="0" smtClean="0">
+                <a:latin typeface="Calibri" pitchFamily="34" charset="0"/>
+              </a:rPr>
+            </a:br>
+            <a:r>
+              <a:rPr lang="de-DE" sz="2800" dirty="0" smtClean="0">
+                <a:latin typeface="Calibri" pitchFamily="34" charset="0"/>
+              </a:rPr>
+              <a:t>und </a:t>
+            </a:r>
+            <a:r>
+              <a:rPr lang="de-DE" sz="2800" dirty="0" err="1" smtClean="0">
+                <a:latin typeface="Calibri" pitchFamily="34" charset="0"/>
+              </a:rPr>
+              <a:t>mede</a:t>
+            </a:r>
+            <a:r>
+              <a:rPr lang="de-DE" sz="2800" dirty="0" smtClean="0">
+                <a:latin typeface="Calibri" pitchFamily="34" charset="0"/>
+              </a:rPr>
+              <a:t> </a:t>
+            </a:r>
+            <a:r>
+              <a:rPr lang="de-DE" sz="2800" smtClean="0">
+                <a:latin typeface="Calibri" pitchFamily="34" charset="0"/>
+              </a:rPr>
+              <a:t>Dich zum Turnier an: </a:t>
+            </a:r>
+            <a:r>
+              <a:rPr lang="de-DE" sz="2400" u="sng" dirty="0" smtClean="0">
+                <a:solidFill>
+                  <a:schemeClr val="accent2"/>
+                </a:solidFill>
+                <a:latin typeface="Calibri" pitchFamily="34" charset="0"/>
+              </a:rPr>
+              <a:t>http://tinyurl.com/einfmod-1</a:t>
+            </a:r>
+            <a:endParaRPr lang="de-DE" sz="2400" u="sng" dirty="0">
+              <a:solidFill>
+                <a:schemeClr val="accent2"/>
+              </a:solidFill>
+              <a:latin typeface="Calibri" pitchFamily="34" charset="0"/>
+            </a:endParaRPr>
+          </a:p>
+        </p:txBody>
+      </p:sp>
+      <p:sp>
+        <p:nvSpPr>
+          <p:cNvPr id="10" name="Rechteck 9"/>
+          <p:cNvSpPr/>
+          <p:nvPr/>
+        </p:nvSpPr>
+        <p:spPr bwMode="auto">
+          <a:xfrm>
+            <a:off x="251520" y="476672"/>
+            <a:ext cx="5544616" cy="3600400"/>
+          </a:xfrm>
+          <a:prstGeom prst="rect">
+            <a:avLst/>
+          </a:prstGeom>
+          <a:solidFill>
+            <a:schemeClr val="bg1">
+              <a:alpha val="69000"/>
+            </a:schemeClr>
+          </a:solidFill>
+          <a:ln w="19050" cap="flat" cmpd="sng" algn="ctr">
+            <a:noFill/>
+            <a:prstDash val="solid"/>
+            <a:round/>
+            <a:headEnd type="none" w="med" len="med"/>
+            <a:tailEnd type="none" w="med" len="med"/>
+          </a:ln>
+          <a:effectLst/>
+        </p:spPr>
+        <p:txBody>
+          <a:bodyPr vert="horz" wrap="square" lIns="91440" tIns="45720" rIns="91440" bIns="45720" numCol="1" rtlCol="0" anchor="t" anchorCtr="0" compatLnSpc="1">
+            <a:prstTxWarp prst="textNoShape">
+              <a:avLst/>
+            </a:prstTxWarp>
+          </a:bodyPr>
+          <a:lstStyle/>
+          <a:p>
+            <a:pPr marL="0" marR="0" indent="0" algn="l" defTabSz="914400" rtl="0" eaLnBrk="1" fontAlgn="base" latinLnBrk="0" hangingPunct="1">
+              <a:lnSpc>
+                <a:spcPct val="100000"/>
+              </a:lnSpc>
+              <a:spcBef>
+                <a:spcPct val="0"/>
+              </a:spcBef>
+              <a:spcAft>
+                <a:spcPct val="0"/>
+              </a:spcAft>
+              <a:buClrTx/>
+              <a:buSzTx/>
+              <a:buFontTx/>
+              <a:buNone/>
+              <a:tabLst/>
+            </a:pPr>
+            <a:endParaRPr kumimoji="0" lang="en-GB" sz="1600" b="0" i="0" u="none" strike="noStrike" cap="none" normalizeH="0" baseline="0" smtClean="0">
+              <a:ln>
+                <a:noFill/>
+              </a:ln>
+              <a:solidFill>
+                <a:schemeClr val="tx1"/>
+              </a:solidFill>
+              <a:effectLst/>
+              <a:latin typeface="Arial" charset="0"/>
+            </a:endParaRPr>
+          </a:p>
+        </p:txBody>
+      </p:sp>
+    </p:spTree>
+  </p:cSld>
+  <p:clrMapOvr>
+    <a:masterClrMapping/>
+  </p:clrMapOvr>
+  <p:transition>
+    <p:zoom/>
+  </p:transition>
+  <p:timing>
+    <p:tnLst>
+      <p:par>
+        <p:cTn id="1" dur="indefinite" restart="never" nodeType="tmRoot"/>
+      </p:par>
+    </p:tnLst>
+  </p:timing>
+</p:sld>
+</file>
+
+<file path=ppt/slides/slide7.xml><?xml version="1.0" encoding="utf-8"?>
 <p:sld xmlns:a="http://schemas.openxmlformats.org/drawingml/2006/main" xmlns:r="http://schemas.openxmlformats.org/officeDocument/2006/relationships" xmlns:p="http://schemas.openxmlformats.org/presentationml/2006/main">
   <p:cSld>
     <p:spTree>
@@ -9228,7 +9754,7 @@
 </p:sld>
 </file>
 
-<file path=ppt/slides/slide7.xml><?xml version="1.0" encoding="utf-8"?>
+<file path=ppt/slides/slide8.xml><?xml version="1.0" encoding="utf-8"?>
 <p:sld xmlns:a="http://schemas.openxmlformats.org/drawingml/2006/main" xmlns:r="http://schemas.openxmlformats.org/officeDocument/2006/relationships" xmlns:p="http://schemas.openxmlformats.org/presentationml/2006/main">
   <p:cSld>
     <p:spTree>
@@ -9631,110 +10157,6 @@
 </p:sld>
 </file>
 
-<file path=ppt/slides/slide8.xml><?xml version="1.0" encoding="utf-8"?>
-<p:sld xmlns:a="http://schemas.openxmlformats.org/drawingml/2006/main" xmlns:r="http://schemas.openxmlformats.org/officeDocument/2006/relationships" xmlns:p="http://schemas.openxmlformats.org/presentationml/2006/main">
-  <p:cSld>
-    <p:spTree>
-      <p:nvGrpSpPr>
-        <p:cNvPr id="1" name=""/>
-        <p:cNvGrpSpPr/>
-        <p:nvPr/>
-      </p:nvGrpSpPr>
-      <p:grpSpPr>
-        <a:xfrm>
-          <a:off x="0" y="0"/>
-          <a:ext cx="0" cy="0"/>
-          <a:chOff x="0" y="0"/>
-          <a:chExt cx="0" cy="0"/>
-        </a:xfrm>
-      </p:grpSpPr>
-      <p:sp>
-        <p:nvSpPr>
-          <p:cNvPr id="13" name="Textfeld 12"/>
-          <p:cNvSpPr txBox="1"/>
-          <p:nvPr/>
-        </p:nvSpPr>
-        <p:spPr>
-          <a:xfrm>
-            <a:off x="1" y="-21515"/>
-            <a:ext cx="9108504" cy="476250"/>
-          </a:xfrm>
-          <a:prstGeom prst="rect">
-            <a:avLst/>
-          </a:prstGeom>
-          <a:noFill/>
-          <a:effectLst/>
-        </p:spPr>
-        <p:txBody>
-          <a:bodyPr wrap="square" lIns="0" rIns="0" rtlCol="0">
-            <a:noAutofit/>
-          </a:bodyPr>
-          <a:lstStyle/>
-          <a:p>
-            <a:pPr algn="ctr">
-              <a:spcAft>
-                <a:spcPts val="0"/>
-              </a:spcAft>
-              <a:defRPr/>
-            </a:pPr>
-            <a:r>
-              <a:rPr lang="de-DE" sz="2800" dirty="0" smtClean="0">
-                <a:solidFill>
-                  <a:schemeClr val="bg1">
-                    <a:lumMod val="85000"/>
-                  </a:schemeClr>
-                </a:solidFill>
-                <a:latin typeface="Calibri" pitchFamily="34" charset="0"/>
-              </a:rPr>
-              <a:t>Warum R? </a:t>
-            </a:r>
-          </a:p>
-        </p:txBody>
-      </p:sp>
-      <p:pic>
-        <p:nvPicPr>
-          <p:cNvPr id="8194" name="Picture 2" descr="http://developer.r-project.org/Logo/Rlogo-1.png"/>
-          <p:cNvPicPr>
-            <a:picLocks noChangeAspect="1" noChangeArrowheads="1"/>
-          </p:cNvPicPr>
-          <p:nvPr/>
-        </p:nvPicPr>
-        <p:blipFill>
-          <a:blip r:embed="rId3" cstate="print"/>
-          <a:srcRect/>
-          <a:stretch>
-            <a:fillRect/>
-          </a:stretch>
-        </p:blipFill>
-        <p:spPr bwMode="auto">
-          <a:xfrm>
-            <a:off x="1115616" y="954013"/>
-            <a:ext cx="6336630" cy="4807099"/>
-          </a:xfrm>
-          <a:prstGeom prst="rect">
-            <a:avLst/>
-          </a:prstGeom>
-          <a:noFill/>
-        </p:spPr>
-      </p:pic>
-    </p:spTree>
-  </p:cSld>
-  <p:clrMapOvr>
-    <a:masterClrMapping/>
-  </p:clrMapOvr>
-  <p:transition>
-    <p:zoom/>
-  </p:transition>
-  <p:timing>
-    <p:tnLst>
-      <p:par>
-        <p:cTn id="1" dur="indefinite" restart="never" nodeType="tmRoot"/>
-      </p:par>
-    </p:tnLst>
-  </p:timing>
-</p:sld>
-</file>
-
 <file path=ppt/slides/slide9.xml><?xml version="1.0" encoding="utf-8"?>
 <p:sld xmlns:a="http://schemas.openxmlformats.org/drawingml/2006/main" xmlns:r="http://schemas.openxmlformats.org/officeDocument/2006/relationships" xmlns:p="http://schemas.openxmlformats.org/presentationml/2006/main">
   <p:cSld>
@@ -9821,270 +10243,6 @@
           <a:noFill/>
         </p:spPr>
       </p:pic>
-      <p:sp>
-        <p:nvSpPr>
-          <p:cNvPr id="4" name="Rechteck 3"/>
-          <p:cNvSpPr/>
-          <p:nvPr/>
-        </p:nvSpPr>
-        <p:spPr bwMode="auto">
-          <a:xfrm>
-            <a:off x="0" y="476250"/>
-            <a:ext cx="9144000" cy="5761062"/>
-          </a:xfrm>
-          <a:prstGeom prst="rect">
-            <a:avLst/>
-          </a:prstGeom>
-          <a:solidFill>
-            <a:srgbClr val="FFFFFF">
-              <a:alpha val="60000"/>
-            </a:srgbClr>
-          </a:solidFill>
-          <a:ln w="19050" cap="flat" cmpd="sng" algn="ctr">
-            <a:noFill/>
-            <a:prstDash val="solid"/>
-            <a:round/>
-            <a:headEnd type="none" w="med" len="med"/>
-            <a:tailEnd type="none" w="med" len="med"/>
-          </a:ln>
-          <a:effectLst/>
-        </p:spPr>
-        <p:txBody>
-          <a:bodyPr vert="horz" wrap="square" lIns="91440" tIns="45720" rIns="91440" bIns="45720" numCol="1" rtlCol="0" anchor="t" anchorCtr="0" compatLnSpc="1">
-            <a:prstTxWarp prst="textNoShape">
-              <a:avLst/>
-            </a:prstTxWarp>
-          </a:bodyPr>
-          <a:lstStyle/>
-          <a:p>
-            <a:pPr marL="0" marR="0" indent="0" algn="l" defTabSz="914400" rtl="0" eaLnBrk="1" fontAlgn="base" latinLnBrk="0" hangingPunct="1">
-              <a:lnSpc>
-                <a:spcPct val="100000"/>
-              </a:lnSpc>
-              <a:spcBef>
-                <a:spcPct val="0"/>
-              </a:spcBef>
-              <a:spcAft>
-                <a:spcPct val="0"/>
-              </a:spcAft>
-              <a:buClrTx/>
-              <a:buSzTx/>
-              <a:buFontTx/>
-              <a:buNone/>
-              <a:tabLst/>
-            </a:pPr>
-            <a:endParaRPr kumimoji="0" lang="de-DE" sz="1600" b="0" i="0" u="none" strike="noStrike" cap="none" normalizeH="0" baseline="0" smtClean="0">
-              <a:ln>
-                <a:noFill/>
-              </a:ln>
-              <a:solidFill>
-                <a:schemeClr val="tx1"/>
-              </a:solidFill>
-              <a:effectLst/>
-              <a:latin typeface="Arial" charset="0"/>
-            </a:endParaRPr>
-          </a:p>
-        </p:txBody>
-      </p:sp>
-      <p:sp>
-        <p:nvSpPr>
-          <p:cNvPr id="5" name="Textfeld 4"/>
-          <p:cNvSpPr txBox="1"/>
-          <p:nvPr/>
-        </p:nvSpPr>
-        <p:spPr>
-          <a:xfrm>
-            <a:off x="755575" y="908720"/>
-            <a:ext cx="8209037" cy="3647152"/>
-          </a:xfrm>
-          <a:prstGeom prst="rect">
-            <a:avLst/>
-          </a:prstGeom>
-          <a:noFill/>
-        </p:spPr>
-        <p:txBody>
-          <a:bodyPr wrap="square" rtlCol="0">
-            <a:spAutoFit/>
-          </a:bodyPr>
-          <a:lstStyle/>
-          <a:p>
-            <a:pPr>
-              <a:spcAft>
-                <a:spcPts val="600"/>
-              </a:spcAft>
-            </a:pPr>
-            <a:r>
-              <a:rPr lang="de-DE" sz="2800" dirty="0" smtClean="0">
-                <a:latin typeface="Calibri" pitchFamily="34" charset="0"/>
-              </a:rPr>
-              <a:t>Programmieren in R </a:t>
-            </a:r>
-          </a:p>
-          <a:p>
-            <a:pPr marL="174625" indent="-174625">
-              <a:spcAft>
-                <a:spcPts val="600"/>
-              </a:spcAft>
-              <a:buFont typeface="Wingdings" pitchFamily="2" charset="2"/>
-              <a:buChar char="§"/>
-            </a:pPr>
-            <a:r>
-              <a:rPr lang="de-DE" sz="2400" dirty="0" smtClean="0">
-                <a:latin typeface="Calibri" pitchFamily="34" charset="0"/>
-              </a:rPr>
-              <a:t>frei verfügbar (und quelloffen)</a:t>
-            </a:r>
-          </a:p>
-          <a:p>
-            <a:pPr marL="174625" indent="-174625">
-              <a:spcAft>
-                <a:spcPts val="600"/>
-              </a:spcAft>
-              <a:buFont typeface="Wingdings" pitchFamily="2" charset="2"/>
-              <a:buChar char="§"/>
-            </a:pPr>
-            <a:r>
-              <a:rPr lang="de-DE" sz="2400" dirty="0" smtClean="0">
-                <a:latin typeface="Calibri" pitchFamily="34" charset="0"/>
-              </a:rPr>
-              <a:t>Linux/Mac/Windows</a:t>
-            </a:r>
-          </a:p>
-          <a:p>
-            <a:pPr marL="174625" indent="-174625">
-              <a:spcAft>
-                <a:spcPts val="600"/>
-              </a:spcAft>
-              <a:buFont typeface="Wingdings" pitchFamily="2" charset="2"/>
-              <a:buChar char="§"/>
-            </a:pPr>
-            <a:r>
-              <a:rPr lang="de-DE" sz="2400" dirty="0" smtClean="0">
-                <a:latin typeface="Calibri" pitchFamily="34" charset="0"/>
-              </a:rPr>
-              <a:t>leicht erlernbar und gut lesbar</a:t>
-            </a:r>
-          </a:p>
-          <a:p>
-            <a:pPr marL="174625" indent="-174625">
-              <a:spcAft>
-                <a:spcPts val="600"/>
-              </a:spcAft>
-              <a:buFont typeface="Wingdings" pitchFamily="2" charset="2"/>
-              <a:buChar char="§"/>
-            </a:pPr>
-            <a:r>
-              <a:rPr lang="de-DE" sz="2400" dirty="0" smtClean="0">
-                <a:latin typeface="Calibri" pitchFamily="34" charset="0"/>
-              </a:rPr>
-              <a:t>interaktiv</a:t>
-            </a:r>
-          </a:p>
-          <a:p>
-            <a:pPr marL="174625" indent="-174625">
-              <a:spcAft>
-                <a:spcPts val="600"/>
-              </a:spcAft>
-              <a:buFont typeface="Wingdings" pitchFamily="2" charset="2"/>
-              <a:buChar char="§"/>
-            </a:pPr>
-            <a:r>
-              <a:rPr lang="de-DE" sz="2400" dirty="0" smtClean="0">
-                <a:latin typeface="Calibri" pitchFamily="34" charset="0"/>
-              </a:rPr>
-              <a:t>Tausende Erweiterungspakete für unterschiedlichste Aufgaben</a:t>
-            </a:r>
-          </a:p>
-          <a:p>
-            <a:pPr marL="174625" indent="-174625">
-              <a:spcAft>
-                <a:spcPts val="600"/>
-              </a:spcAft>
-              <a:buFont typeface="Wingdings" pitchFamily="2" charset="2"/>
-              <a:buChar char="§"/>
-            </a:pPr>
-            <a:r>
-              <a:rPr lang="de-DE" sz="2400" dirty="0" smtClean="0">
-                <a:latin typeface="Calibri" pitchFamily="34" charset="0"/>
-              </a:rPr>
-              <a:t>aktive Nutzer- und Entwicklercommunity</a:t>
-            </a:r>
-          </a:p>
-          <a:p>
-            <a:pPr marL="174625" indent="-174625">
-              <a:spcAft>
-                <a:spcPts val="600"/>
-              </a:spcAft>
-              <a:buFont typeface="Wingdings" pitchFamily="2" charset="2"/>
-              <a:buChar char="§"/>
-            </a:pPr>
-            <a:r>
-              <a:rPr lang="de-DE" sz="2400" dirty="0" smtClean="0">
-                <a:latin typeface="Calibri" pitchFamily="34" charset="0"/>
-              </a:rPr>
-              <a:t>freie Alternativen: Python, Julia</a:t>
-            </a:r>
-          </a:p>
-        </p:txBody>
-      </p:sp>
-      <p:sp>
-        <p:nvSpPr>
-          <p:cNvPr id="6" name="Textfeld 5"/>
-          <p:cNvSpPr txBox="1"/>
-          <p:nvPr/>
-        </p:nvSpPr>
-        <p:spPr>
-          <a:xfrm>
-            <a:off x="395289" y="4941168"/>
-            <a:ext cx="8569324" cy="1200329"/>
-          </a:xfrm>
-          <a:prstGeom prst="rect">
-            <a:avLst/>
-          </a:prstGeom>
-          <a:noFill/>
-        </p:spPr>
-        <p:txBody>
-          <a:bodyPr wrap="square" rtlCol="0">
-            <a:spAutoFit/>
-          </a:bodyPr>
-          <a:lstStyle/>
-          <a:p>
-            <a:pPr algn="ctr"/>
-            <a:r>
-              <a:rPr lang="de-DE" sz="3600" dirty="0" smtClean="0">
-                <a:latin typeface="Calibri" pitchFamily="34" charset="0"/>
-              </a:rPr>
-              <a:t>R ist eine Sprache. </a:t>
-            </a:r>
-            <a:br>
-              <a:rPr lang="de-DE" sz="3600" dirty="0" smtClean="0">
-                <a:latin typeface="Calibri" pitchFamily="34" charset="0"/>
-              </a:rPr>
-            </a:br>
-            <a:r>
-              <a:rPr lang="de-DE" sz="3600" dirty="0" smtClean="0">
-                <a:latin typeface="Calibri" pitchFamily="34" charset="0"/>
-              </a:rPr>
-              <a:t>Sprachen lernt man </a:t>
-            </a:r>
-            <a:r>
-              <a:rPr lang="de-DE" sz="3600" dirty="0" err="1" smtClean="0">
-                <a:latin typeface="Calibri" pitchFamily="34" charset="0"/>
-              </a:rPr>
-              <a:t>durch‘s</a:t>
-            </a:r>
-            <a:r>
-              <a:rPr lang="de-DE" sz="3600" dirty="0" smtClean="0">
-                <a:latin typeface="Calibri" pitchFamily="34" charset="0"/>
-              </a:rPr>
-              <a:t> Sprechen!</a:t>
-            </a:r>
-            <a:endParaRPr lang="de-DE" sz="3600" dirty="0">
-              <a:latin typeface="Calibri" pitchFamily="34" charset="0"/>
-            </a:endParaRPr>
-          </a:p>
-        </p:txBody>
-      </p:sp>
     </p:spTree>
   </p:cSld>
   <p:clrMapOvr>
@@ -10096,180 +10254,9 @@
   <p:timing>
     <p:tnLst>
       <p:par>
-        <p:cTn id="1" dur="indefinite" restart="never" nodeType="tmRoot">
-          <p:childTnLst>
-            <p:seq concurrent="1" nextAc="seek">
-              <p:cTn id="2" dur="indefinite" nodeType="mainSeq">
-                <p:childTnLst>
-                  <p:par>
-                    <p:cTn id="3" fill="hold">
-                      <p:stCondLst>
-                        <p:cond delay="indefinite"/>
-                      </p:stCondLst>
-                      <p:childTnLst>
-                        <p:par>
-                          <p:cTn id="4" fill="hold">
-                            <p:stCondLst>
-                              <p:cond delay="0"/>
-                            </p:stCondLst>
-                            <p:childTnLst>
-                              <p:par>
-                                <p:cTn id="5" presetID="22" presetClass="entr" presetSubtype="1" fill="hold" grpId="0" nodeType="clickEffect">
-                                  <p:stCondLst>
-                                    <p:cond delay="0"/>
-                                  </p:stCondLst>
-                                  <p:childTnLst>
-                                    <p:set>
-                                      <p:cBhvr>
-                                        <p:cTn id="6" dur="1" fill="hold">
-                                          <p:stCondLst>
-                                            <p:cond delay="0"/>
-                                          </p:stCondLst>
-                                        </p:cTn>
-                                        <p:tgtEl>
-                                          <p:spTgt spid="5"/>
-                                        </p:tgtEl>
-                                        <p:attrNameLst>
-                                          <p:attrName>style.visibility</p:attrName>
-                                        </p:attrNameLst>
-                                      </p:cBhvr>
-                                      <p:to>
-                                        <p:strVal val="visible"/>
-                                      </p:to>
-                                    </p:set>
-                                    <p:animEffect transition="in" filter="wipe(up)">
-                                      <p:cBhvr>
-                                        <p:cTn id="7" dur="500"/>
-                                        <p:tgtEl>
-                                          <p:spTgt spid="5"/>
-                                        </p:tgtEl>
-                                      </p:cBhvr>
-                                    </p:animEffect>
-                                  </p:childTnLst>
-                                </p:cTn>
-                              </p:par>
-                            </p:childTnLst>
-                          </p:cTn>
-                        </p:par>
-                      </p:childTnLst>
-                    </p:cTn>
-                  </p:par>
-                  <p:par>
-                    <p:cTn id="8" fill="hold">
-                      <p:stCondLst>
-                        <p:cond delay="indefinite"/>
-                      </p:stCondLst>
-                      <p:childTnLst>
-                        <p:par>
-                          <p:cTn id="9" fill="hold">
-                            <p:stCondLst>
-                              <p:cond delay="0"/>
-                            </p:stCondLst>
-                            <p:childTnLst>
-                              <p:par>
-                                <p:cTn id="10" presetID="23" presetClass="entr" presetSubtype="288" fill="hold" grpId="0" nodeType="clickEffect">
-                                  <p:stCondLst>
-                                    <p:cond delay="0"/>
-                                  </p:stCondLst>
-                                  <p:childTnLst>
-                                    <p:set>
-                                      <p:cBhvr>
-                                        <p:cTn id="11" dur="1" fill="hold">
-                                          <p:stCondLst>
-                                            <p:cond delay="0"/>
-                                          </p:stCondLst>
-                                        </p:cTn>
-                                        <p:tgtEl>
-                                          <p:spTgt spid="6"/>
-                                        </p:tgtEl>
-                                        <p:attrNameLst>
-                                          <p:attrName>style.visibility</p:attrName>
-                                        </p:attrNameLst>
-                                      </p:cBhvr>
-                                      <p:to>
-                                        <p:strVal val="visible"/>
-                                      </p:to>
-                                    </p:set>
-                                    <p:anim calcmode="lin" valueType="num">
-                                      <p:cBhvr>
-                                        <p:cTn id="12" dur="500" fill="hold"/>
-                                        <p:tgtEl>
-                                          <p:spTgt spid="6"/>
-                                        </p:tgtEl>
-                                        <p:attrNameLst>
-                                          <p:attrName>ppt_w</p:attrName>
-                                        </p:attrNameLst>
-                                      </p:cBhvr>
-                                      <p:tavLst>
-                                        <p:tav tm="0">
-                                          <p:val>
-                                            <p:strVal val="4/3*#ppt_w"/>
-                                          </p:val>
-                                        </p:tav>
-                                        <p:tav tm="100000">
-                                          <p:val>
-                                            <p:strVal val="#ppt_w"/>
-                                          </p:val>
-                                        </p:tav>
-                                      </p:tavLst>
-                                    </p:anim>
-                                    <p:anim calcmode="lin" valueType="num">
-                                      <p:cBhvr>
-                                        <p:cTn id="13" dur="500" fill="hold"/>
-                                        <p:tgtEl>
-                                          <p:spTgt spid="6"/>
-                                        </p:tgtEl>
-                                        <p:attrNameLst>
-                                          <p:attrName>ppt_h</p:attrName>
-                                        </p:attrNameLst>
-                                      </p:cBhvr>
-                                      <p:tavLst>
-                                        <p:tav tm="0">
-                                          <p:val>
-                                            <p:strVal val="4/3*#ppt_h"/>
-                                          </p:val>
-                                        </p:tav>
-                                        <p:tav tm="100000">
-                                          <p:val>
-                                            <p:strVal val="#ppt_h"/>
-                                          </p:val>
-                                        </p:tav>
-                                      </p:tavLst>
-                                    </p:anim>
-                                  </p:childTnLst>
-                                </p:cTn>
-                              </p:par>
-                            </p:childTnLst>
-                          </p:cTn>
-                        </p:par>
-                      </p:childTnLst>
-                    </p:cTn>
-                  </p:par>
-                </p:childTnLst>
-              </p:cTn>
-              <p:prevCondLst>
-                <p:cond evt="onPrev" delay="0">
-                  <p:tgtEl>
-                    <p:sldTgt/>
-                  </p:tgtEl>
-                </p:cond>
-              </p:prevCondLst>
-              <p:nextCondLst>
-                <p:cond evt="onNext" delay="0">
-                  <p:tgtEl>
-                    <p:sldTgt/>
-                  </p:tgtEl>
-                </p:cond>
-              </p:nextCondLst>
-            </p:seq>
-          </p:childTnLst>
-        </p:cTn>
+        <p:cTn id="1" dur="indefinite" restart="never" nodeType="tmRoot"/>
       </p:par>
     </p:tnLst>
-    <p:bldLst>
-      <p:bldP spid="5" grpId="0"/>
-      <p:bldP spid="6" grpId="0"/>
-    </p:bldLst>
   </p:timing>
 </p:sld>
 </file>

</xml_diff>

<commit_message>
cosmetic changes in codefights for Termin 3
</commit_message>
<xml_diff>
--- a/Termin_1/folien/UebungModellierung#1.pptx
+++ b/Termin_1/folien/UebungModellierung#1.pptx
@@ -402,7 +402,7 @@
     </p:spTree>
     <p:extLst>
       <p:ext uri="{BB962C8B-B14F-4D97-AF65-F5344CB8AC3E}">
-        <p14:creationId xmlns="" xmlns:p14="http://schemas.microsoft.com/office/powerpoint/2010/main" val="1882660213"/>
+        <p14:creationId xmlns:p14="http://schemas.microsoft.com/office/powerpoint/2010/main" xmlns="" val="1882660213"/>
       </p:ext>
     </p:extLst>
   </p:cSld>
@@ -741,7 +741,7 @@
     </p:spTree>
     <p:extLst>
       <p:ext uri="{BB962C8B-B14F-4D97-AF65-F5344CB8AC3E}">
-        <p14:creationId xmlns="" xmlns:p14="http://schemas.microsoft.com/office/powerpoint/2010/main" val="2781074432"/>
+        <p14:creationId xmlns:p14="http://schemas.microsoft.com/office/powerpoint/2010/main" xmlns="" val="2781074432"/>
       </p:ext>
     </p:extLst>
   </p:cSld>
@@ -8356,13 +8356,7 @@
               <a:rPr lang="de-DE" sz="2800" b="1" u="sng" dirty="0" smtClean="0">
                 <a:latin typeface="Calibri" pitchFamily="34" charset="0"/>
               </a:rPr>
-              <a:t> </a:t>
-            </a:r>
-            <a:r>
-              <a:rPr lang="de-DE" sz="2800" b="1" u="sng" dirty="0" smtClean="0">
-                <a:latin typeface="Calibri" pitchFamily="34" charset="0"/>
-              </a:rPr>
-              <a:t>5.1.2017  </a:t>
+              <a:t> 5.1.2017  </a:t>
             </a:r>
             <a:r>
               <a:rPr lang="de-DE" sz="2800" b="1" u="sng" smtClean="0">
@@ -9201,19 +9195,13 @@
               <a:t>und </a:t>
             </a:r>
             <a:r>
-              <a:rPr lang="de-DE" sz="2800" dirty="0" err="1" smtClean="0">
-                <a:latin typeface="Calibri" pitchFamily="34" charset="0"/>
-              </a:rPr>
-              <a:t>mede</a:t>
-            </a:r>
-            <a:r>
               <a:rPr lang="de-DE" sz="2800" dirty="0" smtClean="0">
                 <a:latin typeface="Calibri" pitchFamily="34" charset="0"/>
               </a:rPr>
-              <a:t> </a:t>
-            </a:r>
-            <a:r>
-              <a:rPr lang="de-DE" sz="2800" smtClean="0">
+              <a:t>melde </a:t>
+            </a:r>
+            <a:r>
+              <a:rPr lang="de-DE" sz="2800" dirty="0" smtClean="0">
                 <a:latin typeface="Calibri" pitchFamily="34" charset="0"/>
               </a:rPr>
               <a:t>Dich zum Turnier an: </a:t>

</xml_diff>

<commit_message>
cosmetic changes for version 18/19
</commit_message>
<xml_diff>
--- a/Termin_1/folien/UebungModellierung#1.pptx
+++ b/Termin_1/folien/UebungModellierung#1.pptx
@@ -402,7 +402,7 @@
     </p:spTree>
     <p:extLst>
       <p:ext uri="{BB962C8B-B14F-4D97-AF65-F5344CB8AC3E}">
-        <p14:creationId xmlns="" xmlns:p14="http://schemas.microsoft.com/office/powerpoint/2010/main" val="1882660213"/>
+        <p14:creationId xmlns:p14="http://schemas.microsoft.com/office/powerpoint/2010/main" xmlns="" val="1882660213"/>
       </p:ext>
     </p:extLst>
   </p:cSld>
@@ -741,7 +741,7 @@
     </p:spTree>
     <p:extLst>
       <p:ext uri="{BB962C8B-B14F-4D97-AF65-F5344CB8AC3E}">
-        <p14:creationId xmlns="" xmlns:p14="http://schemas.microsoft.com/office/powerpoint/2010/main" val="2781074432"/>
+        <p14:creationId xmlns:p14="http://schemas.microsoft.com/office/powerpoint/2010/main" xmlns="" val="2781074432"/>
       </p:ext>
     </p:extLst>
   </p:cSld>
@@ -2937,7 +2937,12 @@
             <p:ph idx="1"/>
           </p:nvPr>
         </p:nvSpPr>
-        <p:spPr/>
+        <p:spPr>
+          <a:xfrm>
+            <a:off x="683568" y="836712"/>
+            <a:ext cx="7924800" cy="5105400"/>
+          </a:xfrm>
+        </p:spPr>
         <p:txBody>
           <a:bodyPr/>
           <a:lstStyle/>
@@ -4437,7 +4442,7 @@
                 <a:latin typeface="Calibri" pitchFamily="34" charset="0"/>
                 <a:cs typeface="+mn-cs"/>
               </a:rPr>
-              <a:t>2017/18                 </a:t>
+              <a:t>2018/19                 </a:t>
             </a:r>
             <a:r>
               <a:rPr lang="de-DE" noProof="0" dirty="0" smtClean="0">
@@ -4980,7 +4985,7 @@
               <a:rPr lang="de-DE" sz="3600" dirty="0" smtClean="0">
                 <a:latin typeface="Calibri" pitchFamily="34" charset="0"/>
               </a:rPr>
-              <a:t>2017/18</a:t>
+              <a:t>2018/19</a:t>
             </a:r>
             <a:endParaRPr lang="de-DE" sz="3600" dirty="0" smtClean="0">
               <a:latin typeface="Calibri" pitchFamily="34" charset="0"/>
@@ -7393,7 +7398,7 @@
                   <a:schemeClr val="bg1"/>
                 </a:solidFill>
               </a:rPr>
-              <a:t>tinyurl.com/eim-1718-1</a:t>
+              <a:t>tinyurl.com/eim-1819-1</a:t>
             </a:r>
             <a:endParaRPr lang="en-GB" sz="2800" dirty="0">
               <a:solidFill>
@@ -7671,8 +7676,17 @@
               <a:rPr lang="de-DE" sz="3600" dirty="0" smtClean="0">
                 <a:latin typeface="Calibri" pitchFamily="34" charset="0"/>
               </a:rPr>
-              <a:t>Wintersemester 2016/17</a:t>
-            </a:r>
+              <a:t>Wintersemester </a:t>
+            </a:r>
+            <a:r>
+              <a:rPr lang="de-DE" sz="3600" dirty="0" smtClean="0">
+                <a:latin typeface="Calibri" pitchFamily="34" charset="0"/>
+              </a:rPr>
+              <a:t>2018/19</a:t>
+            </a:r>
+            <a:endParaRPr lang="de-DE" sz="3600" dirty="0" smtClean="0">
+              <a:latin typeface="Calibri" pitchFamily="34" charset="0"/>
+            </a:endParaRPr>
           </a:p>
           <a:p>
             <a:pPr lvl="0" algn="ctr">
@@ -8009,8 +8023,17 @@
               <a:rPr lang="de-DE" sz="3600" dirty="0" smtClean="0">
                 <a:latin typeface="Calibri" pitchFamily="34" charset="0"/>
               </a:rPr>
-              <a:t>Wintersemester 2016/17</a:t>
-            </a:r>
+              <a:t>Wintersemester </a:t>
+            </a:r>
+            <a:r>
+              <a:rPr lang="de-DE" sz="3600" dirty="0" smtClean="0">
+                <a:latin typeface="Calibri" pitchFamily="34" charset="0"/>
+              </a:rPr>
+              <a:t>2018/19</a:t>
+            </a:r>
+            <a:endParaRPr lang="de-DE" sz="3600" dirty="0" smtClean="0">
+              <a:latin typeface="Calibri" pitchFamily="34" charset="0"/>
+            </a:endParaRPr>
           </a:p>
           <a:p>
             <a:pPr lvl="0" algn="ctr">
@@ -8322,7 +8345,7 @@
 </file>
 
 <file path=ppt/slides/slide4.xml><?xml version="1.0" encoding="utf-8"?>
-<p:sld xmlns:a="http://schemas.openxmlformats.org/drawingml/2006/main" xmlns:r="http://schemas.openxmlformats.org/officeDocument/2006/relationships" xmlns:p="http://schemas.openxmlformats.org/presentationml/2006/main">
+<p:sld xmlns:a="http://schemas.openxmlformats.org/drawingml/2006/main" xmlns:r="http://schemas.openxmlformats.org/officeDocument/2006/relationships" xmlns:p="http://schemas.openxmlformats.org/presentationml/2006/main" show="0">
   <p:cSld>
     <p:spTree>
       <p:nvGrpSpPr>
@@ -8411,17 +8434,8 @@
               <a:rPr lang="de-DE" sz="2800" dirty="0" smtClean="0">
                 <a:latin typeface="+mn-lt"/>
               </a:rPr>
-              <a:t> </a:t>
-            </a:r>
-            <a:r>
-              <a:rPr lang="de-DE" sz="2800" dirty="0" smtClean="0">
-                <a:latin typeface="+mn-lt"/>
-              </a:rPr>
-              <a:t>keine Veranstaltung wegen Überschneidung:</a:t>
-            </a:r>
-            <a:endParaRPr lang="de-DE" sz="2800" dirty="0" smtClean="0">
-              <a:latin typeface="+mn-lt"/>
-            </a:endParaRPr>
+              <a:t> keine Veranstaltung wegen Überschneidung:</a:t>
+            </a:r>
           </a:p>
           <a:p>
             <a:pPr lvl="1">
@@ -8432,17 +8446,8 @@
               <a:rPr lang="de-DE" sz="2800" dirty="0" smtClean="0">
                 <a:latin typeface="+mn-lt"/>
               </a:rPr>
-              <a:t> </a:t>
-            </a:r>
-            <a:r>
-              <a:rPr lang="de-DE" sz="2800" dirty="0" smtClean="0">
-                <a:latin typeface="+mn-lt"/>
-              </a:rPr>
-              <a:t>20.12.2017</a:t>
-            </a:r>
-            <a:endParaRPr lang="de-DE" sz="2800" dirty="0" smtClean="0">
-              <a:latin typeface="+mn-lt"/>
-            </a:endParaRPr>
+              <a:t> 20.12.2017</a:t>
+            </a:r>
           </a:p>
           <a:p>
             <a:pPr>
@@ -8453,17 +8458,8 @@
               <a:rPr lang="de-DE" sz="2800" dirty="0" smtClean="0">
                 <a:latin typeface="+mn-lt"/>
               </a:rPr>
-              <a:t> </a:t>
-            </a:r>
-            <a:r>
-              <a:rPr lang="de-DE" sz="2800" dirty="0" smtClean="0">
-                <a:latin typeface="+mn-lt"/>
-              </a:rPr>
-              <a:t>Doppelveranstaltung</a:t>
-            </a:r>
-            <a:endParaRPr lang="de-DE" sz="2800" dirty="0" smtClean="0">
-              <a:latin typeface="+mn-lt"/>
-            </a:endParaRPr>
+              <a:t> Doppelveranstaltung</a:t>
+            </a:r>
           </a:p>
           <a:p>
             <a:pPr lvl="1"/>
@@ -8473,9 +8469,6 @@
               </a:rPr>
               <a:t>10.01.2018, 08:15 - 11:45: Thema 3 + 4 </a:t>
             </a:r>
-            <a:endParaRPr lang="de-DE" sz="2800" dirty="0" smtClean="0">
-              <a:latin typeface="+mn-lt"/>
-            </a:endParaRPr>
           </a:p>
           <a:p>
             <a:pPr>
@@ -8488,9 +8481,6 @@
               </a:rPr>
               <a:t> Einzelveranstaltungen:</a:t>
             </a:r>
-            <a:endParaRPr lang="de-DE" sz="2800" dirty="0" smtClean="0">
-              <a:latin typeface="+mn-lt"/>
-            </a:endParaRPr>
           </a:p>
           <a:p>
             <a:pPr lvl="1"/>
@@ -8498,17 +8488,8 @@
               <a:rPr lang="de-DE" sz="2800" dirty="0" smtClean="0">
                 <a:latin typeface="+mn-lt"/>
               </a:rPr>
-              <a:t>17.01.2018</a:t>
-            </a:r>
-            <a:r>
-              <a:rPr lang="de-DE" sz="2800" dirty="0" smtClean="0">
-                <a:latin typeface="+mn-lt"/>
-              </a:rPr>
-              <a:t>, 10:15 - 11:45: Thema 5 25.01.2018, 10:15 - 11:45: Thema 6 31.01.2018, 10:15 - 11:45: Thema 7</a:t>
-            </a:r>
-            <a:endParaRPr lang="de-DE" sz="2800" dirty="0" smtClean="0">
-              <a:latin typeface="+mn-lt"/>
-            </a:endParaRPr>
+              <a:t>17.01.2018, 10:15 - 11:45: Thema 5 25.01.2018, 10:15 - 11:45: Thema 6 31.01.2018, 10:15 - 11:45: Thema 7</a:t>
+            </a:r>
           </a:p>
           <a:p>
             <a:endParaRPr lang="de-DE" sz="2800" dirty="0">
@@ -8583,17 +8564,8 @@
               <a:rPr lang="de-DE" sz="3600" dirty="0" smtClean="0">
                 <a:latin typeface="Calibri" pitchFamily="34" charset="0"/>
               </a:rPr>
-              <a:t>Wintersemester </a:t>
-            </a:r>
-            <a:r>
-              <a:rPr lang="de-DE" sz="3600" dirty="0" smtClean="0">
-                <a:latin typeface="Calibri" pitchFamily="34" charset="0"/>
-              </a:rPr>
-              <a:t>2017/18</a:t>
-            </a:r>
-            <a:endParaRPr lang="de-DE" sz="3600" dirty="0" smtClean="0">
-              <a:latin typeface="Calibri" pitchFamily="34" charset="0"/>
-            </a:endParaRPr>
+              <a:t>Wintersemester 2017/18</a:t>
+            </a:r>
           </a:p>
           <a:p>
             <a:pPr lvl="0" algn="ctr">
@@ -9188,7 +9160,7 @@
         <p:spPr>
           <a:xfrm>
             <a:off x="395536" y="3068960"/>
-            <a:ext cx="5113635" cy="954107"/>
+            <a:ext cx="5113635" cy="523220"/>
           </a:xfrm>
           <a:prstGeom prst="rect">
             <a:avLst/>
@@ -9205,19 +9177,13 @@
               <a:rPr lang="de-DE" sz="2800" dirty="0" smtClean="0">
                 <a:latin typeface="Calibri" pitchFamily="34" charset="0"/>
               </a:rPr>
-              <a:t>2. E-Mail mit gewähltem Nutzernamen an </a:t>
-            </a:r>
-            <a:r>
-              <a:rPr lang="de-DE" sz="2800" dirty="0" err="1" smtClean="0">
-                <a:latin typeface="Calibri" pitchFamily="34" charset="0"/>
-              </a:rPr>
-              <a:t>francke@uni</a:t>
+              <a:t>2. </a:t>
             </a:r>
             <a:r>
               <a:rPr lang="de-DE" sz="2800" dirty="0" smtClean="0">
                 <a:latin typeface="Calibri" pitchFamily="34" charset="0"/>
               </a:rPr>
-              <a:t>-... </a:t>
+              <a:t>Registrieren </a:t>
             </a:r>
             <a:endParaRPr lang="de-DE" sz="2800" dirty="0">
               <a:latin typeface="Calibri" pitchFamily="34" charset="0"/>
@@ -9234,7 +9200,7 @@
         <p:spPr>
           <a:xfrm>
             <a:off x="395536" y="4174048"/>
-            <a:ext cx="5113635" cy="1261884"/>
+            <a:ext cx="5113635" cy="892552"/>
           </a:xfrm>
           <a:prstGeom prst="rect">
             <a:avLst/>
@@ -9251,19 +9217,7 @@
               <a:rPr lang="de-DE" sz="2800" dirty="0" smtClean="0">
                 <a:latin typeface="Calibri" pitchFamily="34" charset="0"/>
               </a:rPr>
-              <a:t>3. </a:t>
-            </a:r>
-            <a:r>
-              <a:rPr lang="de-DE" sz="2800" dirty="0" smtClean="0">
-                <a:latin typeface="Calibri" pitchFamily="34" charset="0"/>
-              </a:rPr>
-              <a:t>Melde </a:t>
-            </a:r>
-            <a:r>
-              <a:rPr lang="de-DE" sz="2800" dirty="0" smtClean="0">
-                <a:latin typeface="Calibri" pitchFamily="34" charset="0"/>
-              </a:rPr>
-              <a:t>Dich zum Turnier an: </a:t>
+              <a:t>3. Melde Dich zum Turnier an: </a:t>
             </a:r>
             <a:r>
               <a:rPr lang="de-DE" sz="2400" u="sng" dirty="0" smtClean="0">
@@ -9273,27 +9227,20 @@
                 <a:latin typeface="Calibri" pitchFamily="34" charset="0"/>
                 <a:hlinkClick r:id="rId6"/>
               </a:rPr>
-              <a:t>http</a:t>
-            </a:r>
-            <a:r>
-              <a:rPr lang="de-DE" sz="2400" u="sng" dirty="0" smtClean="0">
-                <a:solidFill>
-                  <a:schemeClr val="accent2"/>
-                </a:solidFill>
-                <a:latin typeface="Calibri" pitchFamily="34" charset="0"/>
-                <a:hlinkClick r:id="rId6"/>
-              </a:rPr>
-              <a:t>://</a:t>
+              <a:t>http://</a:t>
             </a:r>
             <a:r>
               <a:rPr lang="de-DE" sz="2400" b="1" dirty="0" smtClean="0">
                 <a:hlinkClick r:id="rId6"/>
               </a:rPr>
-              <a:t>tinyurl.com/eim-1718-1</a:t>
-            </a:r>
-            <a:endParaRPr lang="de-DE" sz="2400" b="1" dirty="0" smtClean="0"/>
-          </a:p>
-          <a:p>
+              <a:t>tinyurl.com/</a:t>
+            </a:r>
+            <a:r>
+              <a:rPr lang="de-DE" sz="2400" b="1" dirty="0" smtClean="0">
+                <a:hlinkClick r:id="rId6"/>
+              </a:rPr>
+              <a:t>eim-1819-1</a:t>
+            </a:r>
             <a:endParaRPr lang="de-DE" sz="2400" u="sng" dirty="0">
               <a:solidFill>
                 <a:schemeClr val="accent2"/>

</xml_diff>

<commit_message>
minor amendments in intro
</commit_message>
<xml_diff>
--- a/Termin_1/folien/UebungModellierung#1.pptx
+++ b/Termin_1/folien/UebungModellierung#1.pptx
@@ -402,7 +402,7 @@
     </p:spTree>
     <p:extLst>
       <p:ext uri="{BB962C8B-B14F-4D97-AF65-F5344CB8AC3E}">
-        <p14:creationId xmlns:p14="http://schemas.microsoft.com/office/powerpoint/2010/main" xmlns="" val="1882660213"/>
+        <p14:creationId xmlns="" xmlns:p14="http://schemas.microsoft.com/office/powerpoint/2010/main" val="1882660213"/>
       </p:ext>
     </p:extLst>
   </p:cSld>
@@ -741,7 +741,7 @@
     </p:spTree>
     <p:extLst>
       <p:ext uri="{BB962C8B-B14F-4D97-AF65-F5344CB8AC3E}">
-        <p14:creationId xmlns:p14="http://schemas.microsoft.com/office/powerpoint/2010/main" xmlns="" val="2781074432"/>
+        <p14:creationId xmlns="" xmlns:p14="http://schemas.microsoft.com/office/powerpoint/2010/main" val="2781074432"/>
       </p:ext>
     </p:extLst>
   </p:cSld>
@@ -4432,27 +4432,7 @@
                 <a:latin typeface="Calibri" pitchFamily="34" charset="0"/>
                 <a:cs typeface="+mn-cs"/>
               </a:rPr>
-              <a:t>Seminar „Einführung in die Modellierung“, Wintersemester </a:t>
-            </a:r>
-            <a:r>
-              <a:rPr lang="de-DE" noProof="0" dirty="0" smtClean="0">
-                <a:solidFill>
-                  <a:schemeClr val="bg1"/>
-                </a:solidFill>
-                <a:latin typeface="Calibri" pitchFamily="34" charset="0"/>
-                <a:cs typeface="+mn-cs"/>
-              </a:rPr>
-              <a:t>2018/19                 </a:t>
-            </a:r>
-            <a:r>
-              <a:rPr lang="de-DE" noProof="0" dirty="0" smtClean="0">
-                <a:solidFill>
-                  <a:schemeClr val="bg1"/>
-                </a:solidFill>
-                <a:latin typeface="Calibri" pitchFamily="34" charset="0"/>
-                <a:cs typeface="+mn-cs"/>
-              </a:rPr>
-              <a:t>#</a:t>
+              <a:t>Seminar „Einführung in die Modellierung“, Wintersemester 2018/19                 #</a:t>
             </a:r>
             <a:fld id="{19621714-58BB-457A-826B-841F6E217726}" type="slidenum">
               <a:rPr lang="de-DE" noProof="0" smtClean="0">
@@ -4979,17 +4959,8 @@
               <a:rPr lang="de-DE" sz="3600" dirty="0" smtClean="0">
                 <a:latin typeface="Calibri" pitchFamily="34" charset="0"/>
               </a:rPr>
-              <a:t>Wintersemester </a:t>
-            </a:r>
-            <a:r>
-              <a:rPr lang="de-DE" sz="3600" dirty="0" smtClean="0">
-                <a:latin typeface="Calibri" pitchFamily="34" charset="0"/>
-              </a:rPr>
-              <a:t>2018/19</a:t>
-            </a:r>
-            <a:endParaRPr lang="de-DE" sz="3600" dirty="0" smtClean="0">
-              <a:latin typeface="Calibri" pitchFamily="34" charset="0"/>
-            </a:endParaRPr>
+              <a:t>Wintersemester 2018/19</a:t>
+            </a:r>
           </a:p>
           <a:p>
             <a:pPr lvl="0" algn="ctr">
@@ -5546,7 +5517,7 @@
         <p:spPr>
           <a:xfrm>
             <a:off x="755575" y="908720"/>
-            <a:ext cx="8209037" cy="3647152"/>
+            <a:ext cx="8209037" cy="4093428"/>
           </a:xfrm>
           <a:prstGeom prst="rect">
             <a:avLst/>
@@ -5658,7 +5629,13 @@
               <a:rPr lang="de-DE" sz="2400" dirty="0" smtClean="0">
                 <a:latin typeface="Calibri" pitchFamily="34" charset="0"/>
               </a:rPr>
-              <a:t>aktive Nutzer- und Entwicklercommunity</a:t>
+              <a:t>aktive Nutzer- und </a:t>
+            </a:r>
+            <a:r>
+              <a:rPr lang="de-DE" sz="2400" dirty="0" smtClean="0">
+                <a:latin typeface="Calibri" pitchFamily="34" charset="0"/>
+              </a:rPr>
+              <a:t>Entwicklercommunity</a:t>
             </a:r>
           </a:p>
           <a:p>
@@ -5673,8 +5650,35 @@
               <a:rPr lang="de-DE" sz="2400" dirty="0" smtClean="0">
                 <a:latin typeface="Calibri" pitchFamily="34" charset="0"/>
               </a:rPr>
-              <a:t>freie Alternativen: Python, Julia</a:t>
-            </a:r>
+              <a:t>Standard-Programmiersprache im Studiengang Geoökologie UP</a:t>
+            </a:r>
+            <a:endParaRPr lang="de-DE" sz="2400" dirty="0" smtClean="0">
+              <a:latin typeface="Calibri" pitchFamily="34" charset="0"/>
+            </a:endParaRPr>
+          </a:p>
+          <a:p>
+            <a:pPr marL="174625" indent="-174625">
+              <a:spcAft>
+                <a:spcPts val="600"/>
+              </a:spcAft>
+              <a:buFont typeface="Wingdings" pitchFamily="2" charset="2"/>
+              <a:buChar char="§"/>
+            </a:pPr>
+            <a:r>
+              <a:rPr lang="de-DE" sz="2400" dirty="0" smtClean="0">
+                <a:latin typeface="Calibri" pitchFamily="34" charset="0"/>
+              </a:rPr>
+              <a:t>freie Alternativen: Python, </a:t>
+            </a:r>
+            <a:r>
+              <a:rPr lang="de-DE" sz="2400" dirty="0" smtClean="0">
+                <a:latin typeface="Calibri" pitchFamily="34" charset="0"/>
+              </a:rPr>
+              <a:t>Julia, Octave</a:t>
+            </a:r>
+            <a:endParaRPr lang="de-DE" sz="2400" dirty="0" smtClean="0">
+              <a:latin typeface="Calibri" pitchFamily="34" charset="0"/>
+            </a:endParaRPr>
           </a:p>
         </p:txBody>
       </p:sp>
@@ -7676,17 +7680,8 @@
               <a:rPr lang="de-DE" sz="3600" dirty="0" smtClean="0">
                 <a:latin typeface="Calibri" pitchFamily="34" charset="0"/>
               </a:rPr>
-              <a:t>Wintersemester </a:t>
-            </a:r>
-            <a:r>
-              <a:rPr lang="de-DE" sz="3600" dirty="0" smtClean="0">
-                <a:latin typeface="Calibri" pitchFamily="34" charset="0"/>
-              </a:rPr>
-              <a:t>2018/19</a:t>
-            </a:r>
-            <a:endParaRPr lang="de-DE" sz="3600" dirty="0" smtClean="0">
-              <a:latin typeface="Calibri" pitchFamily="34" charset="0"/>
-            </a:endParaRPr>
+              <a:t>Wintersemester 2018/19</a:t>
+            </a:r>
           </a:p>
           <a:p>
             <a:pPr lvl="0" algn="ctr">
@@ -8023,17 +8018,8 @@
               <a:rPr lang="de-DE" sz="3600" dirty="0" smtClean="0">
                 <a:latin typeface="Calibri" pitchFamily="34" charset="0"/>
               </a:rPr>
-              <a:t>Wintersemester </a:t>
-            </a:r>
-            <a:r>
-              <a:rPr lang="de-DE" sz="3600" dirty="0" smtClean="0">
-                <a:latin typeface="Calibri" pitchFamily="34" charset="0"/>
-              </a:rPr>
-              <a:t>2018/19</a:t>
-            </a:r>
-            <a:endParaRPr lang="de-DE" sz="3600" dirty="0" smtClean="0">
-              <a:latin typeface="Calibri" pitchFamily="34" charset="0"/>
-            </a:endParaRPr>
+              <a:t>Wintersemester 2018/19</a:t>
+            </a:r>
           </a:p>
           <a:p>
             <a:pPr lvl="0" algn="ctr">
@@ -9177,13 +9163,7 @@
               <a:rPr lang="de-DE" sz="2800" dirty="0" smtClean="0">
                 <a:latin typeface="Calibri" pitchFamily="34" charset="0"/>
               </a:rPr>
-              <a:t>2. </a:t>
-            </a:r>
-            <a:r>
-              <a:rPr lang="de-DE" sz="2800" dirty="0" smtClean="0">
-                <a:latin typeface="Calibri" pitchFamily="34" charset="0"/>
-              </a:rPr>
-              <a:t>Registrieren </a:t>
+              <a:t>2. Registrieren </a:t>
             </a:r>
             <a:endParaRPr lang="de-DE" sz="2800" dirty="0">
               <a:latin typeface="Calibri" pitchFamily="34" charset="0"/>
@@ -9233,13 +9213,7 @@
               <a:rPr lang="de-DE" sz="2400" b="1" dirty="0" smtClean="0">
                 <a:hlinkClick r:id="rId6"/>
               </a:rPr>
-              <a:t>tinyurl.com/</a:t>
-            </a:r>
-            <a:r>
-              <a:rPr lang="de-DE" sz="2400" b="1" dirty="0" smtClean="0">
-                <a:hlinkClick r:id="rId6"/>
-              </a:rPr>
-              <a:t>eim-1819-1</a:t>
+              <a:t>tinyurl.com/eim-1819-1</a:t>
             </a:r>
             <a:endParaRPr lang="de-DE" sz="2400" u="sng" dirty="0">
               <a:solidFill>

</xml_diff>